<commit_message>
por fin, segunda mesa ok!
</commit_message>
<xml_diff>
--- a/Segunda Mesa.pptx
+++ b/Segunda Mesa.pptx
@@ -23,6 +23,7 @@
     <p:sldId id="271" r:id="rId17"/>
     <p:sldId id="272" r:id="rId18"/>
     <p:sldId id="273" r:id="rId19"/>
+    <p:sldId id="274" r:id="rId20"/>
   </p:sldIdLst>
   <p:sldSz cx="9144000" cy="6858000" type="screen4x3"/>
   <p:notesSz cx="6858000" cy="9144000"/>
@@ -144,6 +145,7 @@
             <p14:sldId id="271"/>
             <p14:sldId id="272"/>
             <p14:sldId id="273"/>
+            <p14:sldId id="274"/>
           </p14:sldIdLst>
         </p14:section>
       </p14:sectionLst>
@@ -1137,7 +1139,17 @@
                 <a:latin typeface="Roboto Medium"/>
                 <a:cs typeface="Roboto Medium"/>
               </a:rPr>
-              <a:t>Primera Mesa Proyecto1</a:t>
+              <a:t>Segunda </a:t>
+            </a:r>
+            <a:r>
+              <a:rPr lang="es-CL" sz="2400" b="1" spc="300" dirty="0" smtClean="0">
+                <a:solidFill>
+                  <a:srgbClr val="FFFFFF"/>
+                </a:solidFill>
+                <a:latin typeface="Roboto Medium"/>
+                <a:cs typeface="Roboto Medium"/>
+              </a:rPr>
+              <a:t>Mesa Proyecto1</a:t>
             </a:r>
             <a:endParaRPr lang="es-CL" sz="2400" b="1" spc="300" dirty="0">
               <a:solidFill>
@@ -1180,7 +1192,57 @@
                 <a:latin typeface="Roboto Light"/>
                 <a:cs typeface="Roboto Light"/>
               </a:rPr>
-              <a:t>Valparaíso, 25 de Abril 2018</a:t>
+              <a:t>Valparaíso, </a:t>
+            </a:r>
+            <a:r>
+              <a:rPr lang="en-US" sz="1400" dirty="0">
+                <a:solidFill>
+                  <a:srgbClr val="FFFFFF"/>
+                </a:solidFill>
+                <a:latin typeface="Roboto Light"/>
+                <a:cs typeface="Roboto Light"/>
+              </a:rPr>
+              <a:t>1</a:t>
+            </a:r>
+            <a:r>
+              <a:rPr lang="en-US" sz="1400" dirty="0" smtClean="0">
+                <a:solidFill>
+                  <a:srgbClr val="FFFFFF"/>
+                </a:solidFill>
+                <a:latin typeface="Roboto Light"/>
+                <a:cs typeface="Roboto Light"/>
+              </a:rPr>
+              <a:t> </a:t>
+            </a:r>
+            <a:r>
+              <a:rPr lang="en-US" sz="1400" dirty="0" smtClean="0">
+                <a:solidFill>
+                  <a:srgbClr val="FFFFFF"/>
+                </a:solidFill>
+                <a:latin typeface="Roboto Light"/>
+                <a:cs typeface="Roboto Light"/>
+              </a:rPr>
+              <a:t>de </a:t>
+            </a:r>
+            <a:r>
+              <a:rPr lang="en-US" sz="1400" dirty="0" smtClean="0">
+                <a:solidFill>
+                  <a:srgbClr val="FFFFFF"/>
+                </a:solidFill>
+                <a:latin typeface="Roboto Light"/>
+                <a:cs typeface="Roboto Light"/>
+              </a:rPr>
+              <a:t>Agosto </a:t>
+            </a:r>
+            <a:r>
+              <a:rPr lang="en-US" sz="1400" dirty="0" smtClean="0">
+                <a:solidFill>
+                  <a:srgbClr val="FFFFFF"/>
+                </a:solidFill>
+                <a:latin typeface="Roboto Light"/>
+                <a:cs typeface="Roboto Light"/>
+              </a:rPr>
+              <a:t>2018</a:t>
             </a:r>
             <a:endParaRPr lang="en-US" sz="1400" dirty="0">
               <a:solidFill>
@@ -1425,7 +1487,7 @@
         </p:nvSpPr>
         <p:spPr>
           <a:xfrm>
-            <a:off x="348765" y="1022472"/>
+            <a:off x="233018" y="1138219"/>
             <a:ext cx="6894246" cy="4801314"/>
           </a:xfrm>
           <a:prstGeom prst="rect">
@@ -2454,15 +2516,26 @@
               <a:buChar char="•"/>
             </a:pPr>
             <a:r>
-              <a:rPr lang="es-CL" dirty="0" smtClean="0">
-                <a:solidFill>
-                  <a:schemeClr val="tx2">
-                    <a:lumMod val="75000"/>
-                  </a:schemeClr>
-                </a:solidFill>
-                <a:latin typeface="Roboto Light"/>
-              </a:rPr>
-              <a:t>FFT Fase A estator</a:t>
+              <a:rPr lang="es-CL" u="sng" dirty="0" smtClean="0">
+                <a:solidFill>
+                  <a:schemeClr val="tx2">
+                    <a:lumMod val="75000"/>
+                  </a:schemeClr>
+                </a:solidFill>
+                <a:latin typeface="Roboto Light"/>
+              </a:rPr>
+              <a:t>FFT corriente </a:t>
+            </a:r>
+            <a:r>
+              <a:rPr lang="es-CL" u="sng" dirty="0" smtClean="0">
+                <a:solidFill>
+                  <a:schemeClr val="tx2">
+                    <a:lumMod val="75000"/>
+                  </a:schemeClr>
+                </a:solidFill>
+                <a:latin typeface="Roboto Light"/>
+              </a:rPr>
+              <a:t>Fase A estator</a:t>
             </a:r>
           </a:p>
           <a:p>
@@ -2724,6 +2797,36 @@
           <a:chExt cx="0" cy="0"/>
         </a:xfrm>
       </p:grpSpPr>
+      <p:pic>
+        <p:nvPicPr>
+          <p:cNvPr id="2" name="Imagen 1"/>
+          <p:cNvPicPr>
+            <a:picLocks noChangeAspect="1"/>
+          </p:cNvPicPr>
+          <p:nvPr/>
+        </p:nvPicPr>
+        <p:blipFill>
+          <a:blip r:embed="rId2">
+            <a:extLst>
+              <a:ext uri="{28A0092B-C50C-407E-A947-70E740481C1C}">
+                <a14:useLocalDpi xmlns:a14="http://schemas.microsoft.com/office/drawing/2010/main" val="0"/>
+              </a:ext>
+            </a:extLst>
+          </a:blip>
+          <a:stretch>
+            <a:fillRect/>
+          </a:stretch>
+        </p:blipFill>
+        <p:spPr>
+          <a:xfrm>
+            <a:off x="2801073" y="2917837"/>
+            <a:ext cx="6342928" cy="3604259"/>
+          </a:xfrm>
+          <a:prstGeom prst="rect">
+            <a:avLst/>
+          </a:prstGeom>
+        </p:spPr>
+      </p:pic>
       <p:sp>
         <p:nvSpPr>
           <p:cNvPr id="4" name="TextBox 3"/>
@@ -2802,8 +2905,8 @@
         </p:nvSpPr>
         <p:spPr>
           <a:xfrm>
-            <a:off x="668357" y="1570518"/>
-            <a:ext cx="6639027" cy="369332"/>
+            <a:off x="438478" y="1198378"/>
+            <a:ext cx="6639027" cy="2862322"/>
           </a:xfrm>
           <a:prstGeom prst="rect">
             <a:avLst/>
@@ -2829,8 +2932,314 @@
                 </a:solidFill>
                 <a:latin typeface="Roboto Light"/>
               </a:rPr>
-              <a:t>Aumento</a:t>
-            </a:r>
+              <a:t>Cortocircuito entre espiras, reducción de inductancia estator</a:t>
+            </a:r>
+          </a:p>
+          <a:p>
+            <a:pPr marL="285750" indent="-285750">
+              <a:buFont typeface="Arial"/>
+              <a:buChar char="•"/>
+            </a:pPr>
+            <a:endParaRPr lang="es-CL" dirty="0">
+              <a:solidFill>
+                <a:schemeClr val="tx2">
+                  <a:lumMod val="75000"/>
+                </a:schemeClr>
+              </a:solidFill>
+              <a:latin typeface="Roboto Light"/>
+              <a:cs typeface="Roboto Light"/>
+            </a:endParaRPr>
+          </a:p>
+          <a:p>
+            <a:pPr marL="285750" indent="-285750">
+              <a:buFont typeface="Arial"/>
+              <a:buChar char="•"/>
+            </a:pPr>
+            <a:r>
+              <a:rPr lang="es-CL" dirty="0" smtClean="0">
+                <a:solidFill>
+                  <a:schemeClr val="tx2">
+                    <a:lumMod val="75000"/>
+                  </a:schemeClr>
+                </a:solidFill>
+                <a:latin typeface="Roboto Light"/>
+                <a:cs typeface="Roboto Light"/>
+              </a:rPr>
+              <a:t>No se tiene acceso al estator en el modelo Simulink, por lo cual para simular se adiciona inductancia en serie en tres fases y en 0.6[s</a:t>
+            </a:r>
+            <a:r>
+              <a:rPr lang="en-US" dirty="0" smtClean="0">
+                <a:solidFill>
+                  <a:schemeClr val="tx2">
+                    <a:lumMod val="75000"/>
+                  </a:schemeClr>
+                </a:solidFill>
+                <a:latin typeface="Roboto Light"/>
+                <a:cs typeface="Roboto Light"/>
+              </a:rPr>
+              <a:t>]</a:t>
+            </a:r>
+            <a:r>
+              <a:rPr lang="es-CL" dirty="0" smtClean="0">
+                <a:solidFill>
+                  <a:schemeClr val="tx2">
+                    <a:lumMod val="75000"/>
+                  </a:schemeClr>
+                </a:solidFill>
+                <a:latin typeface="Roboto Light"/>
+                <a:cs typeface="Roboto Light"/>
+              </a:rPr>
+              <a:t> se cortocircuita una de ellas.</a:t>
+            </a:r>
+          </a:p>
+          <a:p>
+            <a:pPr marL="285750" indent="-285750">
+              <a:buFont typeface="Arial"/>
+              <a:buChar char="•"/>
+            </a:pPr>
+            <a:endParaRPr lang="es-CL" dirty="0">
+              <a:solidFill>
+                <a:schemeClr val="tx2">
+                  <a:lumMod val="75000"/>
+                </a:schemeClr>
+              </a:solidFill>
+              <a:latin typeface="Roboto Light"/>
+              <a:cs typeface="Roboto Light"/>
+            </a:endParaRPr>
+          </a:p>
+          <a:p>
+            <a:pPr marL="285750" indent="-285750">
+              <a:buFont typeface="Arial"/>
+              <a:buChar char="•"/>
+            </a:pPr>
+            <a:r>
+              <a:rPr lang="en-US" dirty="0" smtClean="0">
+                <a:solidFill>
+                  <a:schemeClr val="tx2">
+                    <a:lumMod val="75000"/>
+                  </a:schemeClr>
+                </a:solidFill>
+                <a:latin typeface="Roboto Light"/>
+                <a:cs typeface="Roboto Light"/>
+              </a:rPr>
+              <a:t>Motor </a:t>
+            </a:r>
+            <a:r>
+              <a:rPr lang="en-US" dirty="0" err="1" smtClean="0">
+                <a:solidFill>
+                  <a:schemeClr val="tx2">
+                    <a:lumMod val="75000"/>
+                  </a:schemeClr>
+                </a:solidFill>
+                <a:latin typeface="Roboto Light"/>
+                <a:cs typeface="Roboto Light"/>
+              </a:rPr>
+              <a:t>accionado</a:t>
+            </a:r>
+            <a:r>
+              <a:rPr lang="en-US" dirty="0" smtClean="0">
+                <a:solidFill>
+                  <a:schemeClr val="tx2">
+                    <a:lumMod val="75000"/>
+                  </a:schemeClr>
+                </a:solidFill>
+                <a:latin typeface="Roboto Light"/>
+                <a:cs typeface="Roboto Light"/>
+              </a:rPr>
+              <a:t> con </a:t>
+            </a:r>
+            <a:r>
+              <a:rPr lang="en-US" dirty="0" err="1" smtClean="0">
+                <a:solidFill>
+                  <a:schemeClr val="tx2">
+                    <a:lumMod val="75000"/>
+                  </a:schemeClr>
+                </a:solidFill>
+                <a:latin typeface="Roboto Light"/>
+                <a:cs typeface="Roboto Light"/>
+              </a:rPr>
+              <a:t>partida</a:t>
+            </a:r>
+            <a:r>
+              <a:rPr lang="en-US" dirty="0" smtClean="0">
+                <a:solidFill>
+                  <a:schemeClr val="tx2">
+                    <a:lumMod val="75000"/>
+                  </a:schemeClr>
+                </a:solidFill>
+                <a:latin typeface="Roboto Light"/>
+                <a:cs typeface="Roboto Light"/>
+              </a:rPr>
+              <a:t> </a:t>
+            </a:r>
+            <a:r>
+              <a:rPr lang="en-US" dirty="0" err="1" smtClean="0">
+                <a:solidFill>
+                  <a:schemeClr val="tx2">
+                    <a:lumMod val="75000"/>
+                  </a:schemeClr>
+                </a:solidFill>
+                <a:latin typeface="Roboto Light"/>
+                <a:cs typeface="Roboto Light"/>
+              </a:rPr>
+              <a:t>directa</a:t>
+            </a:r>
+            <a:r>
+              <a:rPr lang="en-US" dirty="0" smtClean="0">
+                <a:solidFill>
+                  <a:schemeClr val="tx2">
+                    <a:lumMod val="75000"/>
+                  </a:schemeClr>
+                </a:solidFill>
+                <a:latin typeface="Roboto Light"/>
+                <a:cs typeface="Roboto Light"/>
+              </a:rPr>
+              <a:t>, con </a:t>
+            </a:r>
+            <a:r>
+              <a:rPr lang="en-US" dirty="0" err="1" smtClean="0">
+                <a:solidFill>
+                  <a:schemeClr val="tx2">
+                    <a:lumMod val="75000"/>
+                  </a:schemeClr>
+                </a:solidFill>
+                <a:latin typeface="Roboto Light"/>
+                <a:cs typeface="Roboto Light"/>
+              </a:rPr>
+              <a:t>una</a:t>
+            </a:r>
+            <a:r>
+              <a:rPr lang="en-US" dirty="0" smtClean="0">
+                <a:solidFill>
+                  <a:schemeClr val="tx2">
+                    <a:lumMod val="75000"/>
+                  </a:schemeClr>
+                </a:solidFill>
+                <a:latin typeface="Roboto Light"/>
+                <a:cs typeface="Roboto Light"/>
+              </a:rPr>
+              <a:t> </a:t>
+            </a:r>
+            <a:r>
+              <a:rPr lang="en-US" dirty="0" err="1" smtClean="0">
+                <a:solidFill>
+                  <a:schemeClr val="tx2">
+                    <a:lumMod val="75000"/>
+                  </a:schemeClr>
+                </a:solidFill>
+                <a:latin typeface="Roboto Light"/>
+                <a:cs typeface="Roboto Light"/>
+              </a:rPr>
+              <a:t>carga</a:t>
+            </a:r>
+            <a:r>
+              <a:rPr lang="en-US" dirty="0" smtClean="0">
+                <a:solidFill>
+                  <a:schemeClr val="tx2">
+                    <a:lumMod val="75000"/>
+                  </a:schemeClr>
+                </a:solidFill>
+                <a:latin typeface="Roboto Light"/>
+                <a:cs typeface="Roboto Light"/>
+              </a:rPr>
+              <a:t> 15[Nm]</a:t>
+            </a:r>
+          </a:p>
+          <a:p>
+            <a:pPr marL="285750" indent="-285750">
+              <a:buFont typeface="Arial"/>
+              <a:buChar char="•"/>
+            </a:pPr>
+            <a:endParaRPr lang="en-US" dirty="0" smtClean="0">
+              <a:solidFill>
+                <a:schemeClr val="tx2">
+                  <a:lumMod val="75000"/>
+                </a:schemeClr>
+              </a:solidFill>
+              <a:latin typeface="Roboto Light"/>
+              <a:cs typeface="Roboto Light"/>
+            </a:endParaRPr>
+          </a:p>
+          <a:p>
+            <a:pPr marL="285750" indent="-285750">
+              <a:buFont typeface="Arial"/>
+              <a:buChar char="•"/>
+            </a:pPr>
+            <a:r>
+              <a:rPr lang="en-US" dirty="0" smtClean="0">
+                <a:solidFill>
+                  <a:schemeClr val="tx2">
+                    <a:lumMod val="75000"/>
+                  </a:schemeClr>
+                </a:solidFill>
+                <a:latin typeface="Roboto Light"/>
+                <a:cs typeface="Roboto Light"/>
+              </a:rPr>
+              <a:t>Se </a:t>
+            </a:r>
+            <a:r>
+              <a:rPr lang="en-US" dirty="0" err="1" smtClean="0">
+                <a:solidFill>
+                  <a:schemeClr val="tx2">
+                    <a:lumMod val="75000"/>
+                  </a:schemeClr>
+                </a:solidFill>
+                <a:latin typeface="Roboto Light"/>
+                <a:cs typeface="Roboto Light"/>
+              </a:rPr>
+              <a:t>simula</a:t>
+            </a:r>
+            <a:r>
+              <a:rPr lang="en-US" dirty="0" smtClean="0">
+                <a:solidFill>
+                  <a:schemeClr val="tx2">
+                    <a:lumMod val="75000"/>
+                  </a:schemeClr>
+                </a:solidFill>
+                <a:latin typeface="Roboto Light"/>
+                <a:cs typeface="Roboto Light"/>
+              </a:rPr>
+              <a:t> </a:t>
+            </a:r>
+            <a:r>
+              <a:rPr lang="en-US" dirty="0" err="1" smtClean="0">
+                <a:solidFill>
+                  <a:schemeClr val="tx2">
+                    <a:lumMod val="75000"/>
+                  </a:schemeClr>
+                </a:solidFill>
+                <a:latin typeface="Roboto Light"/>
+                <a:cs typeface="Roboto Light"/>
+              </a:rPr>
+              <a:t>durante</a:t>
+            </a:r>
+            <a:r>
+              <a:rPr lang="en-US" dirty="0" smtClean="0">
+                <a:solidFill>
+                  <a:schemeClr val="tx2">
+                    <a:lumMod val="75000"/>
+                  </a:schemeClr>
+                </a:solidFill>
+                <a:latin typeface="Roboto Light"/>
+                <a:cs typeface="Roboto Light"/>
+              </a:rPr>
+              <a:t> 1.4[s]</a:t>
+            </a:r>
+            <a:endParaRPr lang="en-US" dirty="0">
+              <a:solidFill>
+                <a:schemeClr val="tx2">
+                  <a:lumMod val="75000"/>
+                </a:schemeClr>
+              </a:solidFill>
+              <a:latin typeface="Roboto Light"/>
+              <a:cs typeface="Roboto Light"/>
+            </a:endParaRPr>
+          </a:p>
+          <a:p>
+            <a:pPr marL="285750" indent="-285750">
+              <a:buFont typeface="Arial"/>
+              <a:buChar char="•"/>
+            </a:pPr>
             <a:endParaRPr lang="en-US" dirty="0">
               <a:solidFill>
                 <a:schemeClr val="tx2">
@@ -2890,7 +3299,7 @@
           <p:nvPr/>
         </p:nvPicPr>
         <p:blipFill>
-          <a:blip r:embed="rId2">
+          <a:blip r:embed="rId3">
             <a:extLst>
               <a:ext uri="{28A0092B-C50C-407E-A947-70E740481C1C}">
                 <a14:useLocalDpi xmlns:a14="http://schemas.microsoft.com/office/drawing/2010/main" val="0"/>
@@ -2956,7 +3365,7 @@
         </p:nvSpPr>
         <p:spPr>
           <a:xfrm>
-            <a:off x="-373129" y="419654"/>
+            <a:off x="389076" y="419654"/>
             <a:ext cx="6918308" cy="461665"/>
           </a:xfrm>
           <a:prstGeom prst="rect">
@@ -2970,11 +3379,45 @@
           </a:bodyPr>
           <a:lstStyle/>
           <a:p>
-            <a:pPr lvl="2"/>
-            <a:r>
-              <a:rPr lang="es-CL" sz="2400" b="1" dirty="0"/>
-              <a:t>Componentes y funcionamiento de un VdF</a:t>
-            </a:r>
+            <a:r>
+              <a:rPr lang="en-US" sz="2400" b="1" spc="200" dirty="0" err="1">
+                <a:cs typeface="Roboto Medium"/>
+              </a:rPr>
+              <a:t>Falla</a:t>
+            </a:r>
+            <a:r>
+              <a:rPr lang="en-US" sz="2400" b="1" spc="200" dirty="0">
+                <a:cs typeface="Roboto Medium"/>
+              </a:rPr>
+              <a:t> entre </a:t>
+            </a:r>
+            <a:r>
+              <a:rPr lang="en-US" sz="2400" b="1" spc="200" dirty="0" err="1">
+                <a:cs typeface="Roboto Medium"/>
+              </a:rPr>
+              <a:t>espiras</a:t>
+            </a:r>
+            <a:r>
+              <a:rPr lang="en-US" sz="2400" b="1" spc="200" dirty="0">
+                <a:cs typeface="Roboto Medium"/>
+              </a:rPr>
+              <a:t> del </a:t>
+            </a:r>
+            <a:r>
+              <a:rPr lang="en-US" sz="2400" b="1" spc="200" dirty="0" err="1">
+                <a:cs typeface="Roboto Medium"/>
+              </a:rPr>
+              <a:t>Estator</a:t>
+            </a:r>
+            <a:r>
+              <a:rPr lang="en-US" sz="2400" b="1" spc="200" dirty="0">
+                <a:cs typeface="Roboto Medium"/>
+              </a:rPr>
+              <a:t> </a:t>
+            </a:r>
+            <a:endParaRPr lang="en-US" sz="2400" b="1" spc="200" dirty="0">
+              <a:cs typeface="Roboto Medium"/>
+            </a:endParaRPr>
           </a:p>
         </p:txBody>
       </p:sp>
@@ -2986,8 +3429,8 @@
         </p:nvSpPr>
         <p:spPr>
           <a:xfrm>
-            <a:off x="578362" y="1233634"/>
-            <a:ext cx="7962134" cy="1323439"/>
+            <a:off x="215429" y="1263501"/>
+            <a:ext cx="7962134" cy="3785652"/>
           </a:xfrm>
           <a:prstGeom prst="rect">
             <a:avLst/>
@@ -3005,24 +3448,36 @@
               <a:buChar char="•"/>
             </a:pPr>
             <a:r>
-              <a:rPr lang="it-IT" sz="1600" dirty="0" smtClean="0">
-                <a:solidFill>
-                  <a:schemeClr val="tx2">
-                    <a:lumMod val="75000"/>
-                  </a:schemeClr>
-                </a:solidFill>
-                <a:latin typeface="Roboto Light"/>
-                <a:cs typeface="Roboto Light"/>
-              </a:rPr>
-              <a:t>Sistema basado en electrónica, para el control de velocidad de giro</a:t>
-            </a:r>
-          </a:p>
-          <a:p>
-            <a:pPr marL="285750" indent="-285750">
-              <a:buFont typeface="Arial"/>
-              <a:buChar char="•"/>
-            </a:pPr>
-            <a:endParaRPr lang="it-IT" sz="1600" dirty="0" smtClean="0">
+              <a:rPr lang="it-IT" sz="1600" u="sng" dirty="0">
+                <a:solidFill>
+                  <a:schemeClr val="tx2">
+                    <a:lumMod val="75000"/>
+                  </a:schemeClr>
+                </a:solidFill>
+                <a:latin typeface="Roboto Light"/>
+                <a:cs typeface="Roboto Light"/>
+              </a:rPr>
+              <a:t>Formas de Onda</a:t>
+            </a:r>
+            <a:r>
+              <a:rPr lang="es-CL" sz="1600" dirty="0">
+                <a:solidFill>
+                  <a:schemeClr val="tx2">
+                    <a:lumMod val="75000"/>
+                  </a:schemeClr>
+                </a:solidFill>
+                <a:latin typeface="Roboto Light"/>
+                <a:cs typeface="Roboto Light"/>
+              </a:rPr>
+              <a:t>:</a:t>
+            </a:r>
+          </a:p>
+          <a:p>
+            <a:pPr marL="285750" indent="-285750">
+              <a:buFont typeface="Arial"/>
+              <a:buChar char="•"/>
+            </a:pPr>
+            <a:endParaRPr lang="es-CL" sz="1600" dirty="0">
               <a:solidFill>
                 <a:schemeClr val="tx2">
                   <a:lumMod val="75000"/>
@@ -3038,24 +3493,98 @@
               <a:buChar char="•"/>
             </a:pPr>
             <a:r>
-              <a:rPr lang="it-IT" sz="1600" dirty="0" smtClean="0">
-                <a:solidFill>
-                  <a:schemeClr val="tx2">
-                    <a:lumMod val="75000"/>
-                  </a:schemeClr>
-                </a:solidFill>
-                <a:latin typeface="Roboto Light"/>
-                <a:cs typeface="Roboto Light"/>
-              </a:rPr>
-              <a:t>Durante arranque proporciona baja tensión y frecuencia, evitando sobrecorrientes</a:t>
-            </a:r>
-          </a:p>
-          <a:p>
-            <a:pPr marL="285750" indent="-285750">
-              <a:buFont typeface="Arial"/>
-              <a:buChar char="•"/>
-            </a:pPr>
-            <a:endParaRPr lang="it-IT" sz="1600" dirty="0" smtClean="0">
+              <a:rPr lang="es-CL" sz="1600" dirty="0">
+                <a:solidFill>
+                  <a:schemeClr val="tx2">
+                    <a:lumMod val="75000"/>
+                  </a:schemeClr>
+                </a:solidFill>
+                <a:latin typeface="Roboto Light"/>
+                <a:cs typeface="Roboto Light"/>
+              </a:rPr>
+              <a:t>Corriente estator:</a:t>
+            </a:r>
+            <a:br>
+              <a:rPr lang="es-CL" sz="1600" dirty="0">
+                <a:solidFill>
+                  <a:schemeClr val="tx2">
+                    <a:lumMod val="75000"/>
+                  </a:schemeClr>
+                </a:solidFill>
+                <a:latin typeface="Roboto Light"/>
+                <a:cs typeface="Roboto Light"/>
+              </a:rPr>
+            </a:br>
+            <a:r>
+              <a:rPr lang="es-CL" sz="1600" dirty="0" smtClean="0">
+                <a:solidFill>
+                  <a:schemeClr val="tx2">
+                    <a:lumMod val="75000"/>
+                  </a:schemeClr>
+                </a:solidFill>
+                <a:latin typeface="Roboto Light"/>
+                <a:cs typeface="Roboto Light"/>
+              </a:rPr>
+              <a:t>leve diferencia</a:t>
+            </a:r>
+            <a:br>
+              <a:rPr lang="es-CL" sz="1600" dirty="0" smtClean="0">
+                <a:solidFill>
+                  <a:schemeClr val="tx2">
+                    <a:lumMod val="75000"/>
+                  </a:schemeClr>
+                </a:solidFill>
+                <a:latin typeface="Roboto Light"/>
+                <a:cs typeface="Roboto Light"/>
+              </a:rPr>
+            </a:br>
+            <a:r>
+              <a:rPr lang="es-CL" sz="1600" dirty="0" smtClean="0">
+                <a:solidFill>
+                  <a:schemeClr val="tx2">
+                    <a:lumMod val="75000"/>
+                  </a:schemeClr>
+                </a:solidFill>
+                <a:latin typeface="Roboto Light"/>
+                <a:cs typeface="Roboto Light"/>
+              </a:rPr>
+              <a:t>desbalance</a:t>
+            </a:r>
+            <a:br>
+              <a:rPr lang="es-CL" sz="1600" dirty="0" smtClean="0">
+                <a:solidFill>
+                  <a:schemeClr val="tx2">
+                    <a:lumMod val="75000"/>
+                  </a:schemeClr>
+                </a:solidFill>
+                <a:latin typeface="Roboto Light"/>
+                <a:cs typeface="Roboto Light"/>
+              </a:rPr>
+            </a:br>
+            <a:r>
+              <a:rPr lang="es-CL" sz="1600" dirty="0" smtClean="0">
+                <a:solidFill>
+                  <a:schemeClr val="tx2">
+                    <a:lumMod val="75000"/>
+                  </a:schemeClr>
+                </a:solidFill>
+                <a:latin typeface="Roboto Light"/>
+                <a:cs typeface="Roboto Light"/>
+              </a:rPr>
+              <a:t>post-falla</a:t>
+            </a:r>
+            <a:br>
+              <a:rPr lang="es-CL" sz="1600" dirty="0" smtClean="0">
+                <a:solidFill>
+                  <a:schemeClr val="tx2">
+                    <a:lumMod val="75000"/>
+                  </a:schemeClr>
+                </a:solidFill>
+                <a:latin typeface="Roboto Light"/>
+                <a:cs typeface="Roboto Light"/>
+              </a:rPr>
+            </a:br>
+            <a:endParaRPr lang="es-CL" sz="1600" dirty="0">
               <a:solidFill>
                 <a:schemeClr val="tx2">
                   <a:lumMod val="75000"/>
@@ -3070,17 +3599,134 @@
               <a:buFont typeface="Arial"/>
               <a:buChar char="•"/>
             </a:pPr>
-            <a:r>
-              <a:rPr lang="it-IT" sz="1600" dirty="0" smtClean="0">
-                <a:solidFill>
-                  <a:schemeClr val="tx2">
-                    <a:lumMod val="75000"/>
-                  </a:schemeClr>
-                </a:solidFill>
-                <a:latin typeface="Roboto Light"/>
-                <a:cs typeface="Roboto Light"/>
-              </a:rPr>
-              <a:t>Se compone principalmente de 2 etapas, una rectificadora y una inversora</a:t>
+            <a:endParaRPr lang="es-CL" sz="1600" dirty="0">
+              <a:solidFill>
+                <a:schemeClr val="tx2">
+                  <a:lumMod val="75000"/>
+                </a:schemeClr>
+              </a:solidFill>
+              <a:latin typeface="Roboto Light"/>
+              <a:cs typeface="Roboto Light"/>
+            </a:endParaRPr>
+          </a:p>
+          <a:p>
+            <a:pPr marL="285750" indent="-285750">
+              <a:buFont typeface="Arial"/>
+              <a:buChar char="•"/>
+            </a:pPr>
+            <a:endParaRPr lang="es-CL" sz="1600" dirty="0">
+              <a:solidFill>
+                <a:schemeClr val="tx2">
+                  <a:lumMod val="75000"/>
+                </a:schemeClr>
+              </a:solidFill>
+              <a:latin typeface="Roboto Light"/>
+              <a:cs typeface="Roboto Light"/>
+            </a:endParaRPr>
+          </a:p>
+          <a:p>
+            <a:pPr marL="285750" indent="-285750">
+              <a:buFont typeface="Arial"/>
+              <a:buChar char="•"/>
+            </a:pPr>
+            <a:endParaRPr lang="es-CL" sz="1600" dirty="0">
+              <a:solidFill>
+                <a:schemeClr val="tx2">
+                  <a:lumMod val="75000"/>
+                </a:schemeClr>
+              </a:solidFill>
+              <a:latin typeface="Roboto Light"/>
+              <a:cs typeface="Roboto Light"/>
+            </a:endParaRPr>
+          </a:p>
+          <a:p>
+            <a:endParaRPr lang="es-CL" sz="1600" dirty="0">
+              <a:solidFill>
+                <a:schemeClr val="tx2">
+                  <a:lumMod val="75000"/>
+                </a:schemeClr>
+              </a:solidFill>
+              <a:latin typeface="Roboto Light"/>
+              <a:cs typeface="Roboto Light"/>
+            </a:endParaRPr>
+          </a:p>
+          <a:p>
+            <a:pPr marL="285750" indent="-285750">
+              <a:buFont typeface="Arial"/>
+              <a:buChar char="•"/>
+            </a:pPr>
+            <a:endParaRPr lang="es-CL" sz="1600" dirty="0">
+              <a:solidFill>
+                <a:schemeClr val="tx2">
+                  <a:lumMod val="75000"/>
+                </a:schemeClr>
+              </a:solidFill>
+              <a:latin typeface="Roboto Light"/>
+              <a:cs typeface="Roboto Light"/>
+            </a:endParaRPr>
+          </a:p>
+          <a:p>
+            <a:pPr marL="285750" indent="-285750">
+              <a:buFont typeface="Arial"/>
+              <a:buChar char="•"/>
+            </a:pPr>
+            <a:r>
+              <a:rPr lang="es-CL" sz="1600" dirty="0">
+                <a:solidFill>
+                  <a:schemeClr val="tx2">
+                    <a:lumMod val="75000"/>
+                  </a:schemeClr>
+                </a:solidFill>
+                <a:latin typeface="Roboto Light"/>
+                <a:cs typeface="Roboto Light"/>
+              </a:rPr>
+              <a:t>Velocidad rotor:</a:t>
+            </a:r>
+            <a:br>
+              <a:rPr lang="es-CL" sz="1600" dirty="0">
+                <a:solidFill>
+                  <a:schemeClr val="tx2">
+                    <a:lumMod val="75000"/>
+                  </a:schemeClr>
+                </a:solidFill>
+                <a:latin typeface="Roboto Light"/>
+                <a:cs typeface="Roboto Light"/>
+              </a:rPr>
+            </a:br>
+            <a:r>
+              <a:rPr lang="es-CL" sz="1600" dirty="0">
+                <a:solidFill>
+                  <a:schemeClr val="tx2">
+                    <a:lumMod val="75000"/>
+                  </a:schemeClr>
+                </a:solidFill>
+                <a:latin typeface="Roboto Light"/>
+                <a:cs typeface="Roboto Light"/>
+              </a:rPr>
+              <a:t>ondula y disminuye</a:t>
+            </a:r>
+            <a:br>
+              <a:rPr lang="es-CL" sz="1600" dirty="0">
+                <a:solidFill>
+                  <a:schemeClr val="tx2">
+                    <a:lumMod val="75000"/>
+                  </a:schemeClr>
+                </a:solidFill>
+                <a:latin typeface="Roboto Light"/>
+                <a:cs typeface="Roboto Light"/>
+              </a:rPr>
+            </a:br>
+            <a:r>
+              <a:rPr lang="es-CL" sz="1600" dirty="0">
+                <a:solidFill>
+                  <a:schemeClr val="tx2">
+                    <a:lumMod val="75000"/>
+                  </a:schemeClr>
+                </a:solidFill>
+                <a:latin typeface="Roboto Light"/>
+                <a:cs typeface="Roboto Light"/>
+              </a:rPr>
+              <a:t>su valor medio</a:t>
             </a:r>
             <a:endParaRPr lang="en-US" sz="1600" dirty="0">
               <a:solidFill>
@@ -3164,7 +3810,7 @@
       </p:pic>
       <p:pic>
         <p:nvPicPr>
-          <p:cNvPr id="3" name="Imagen 2"/>
+          <p:cNvPr id="2" name="Imagen 1"/>
           <p:cNvPicPr>
             <a:picLocks noChangeAspect="1"/>
           </p:cNvPicPr>
@@ -3184,8 +3830,38 @@
         </p:blipFill>
         <p:spPr>
           <a:xfrm>
-            <a:off x="1061802" y="2726966"/>
-            <a:ext cx="6797249" cy="3795130"/>
+            <a:off x="2465408" y="1263501"/>
+            <a:ext cx="6678592" cy="2822362"/>
+          </a:xfrm>
+          <a:prstGeom prst="rect">
+            <a:avLst/>
+          </a:prstGeom>
+        </p:spPr>
+      </p:pic>
+      <p:pic>
+        <p:nvPicPr>
+          <p:cNvPr id="5" name="Imagen 4"/>
+          <p:cNvPicPr>
+            <a:picLocks noChangeAspect="1"/>
+          </p:cNvPicPr>
+          <p:nvPr/>
+        </p:nvPicPr>
+        <p:blipFill>
+          <a:blip r:embed="rId4">
+            <a:extLst>
+              <a:ext uri="{28A0092B-C50C-407E-A947-70E740481C1C}">
+                <a14:useLocalDpi xmlns:a14="http://schemas.microsoft.com/office/drawing/2010/main" val="0"/>
+              </a:ext>
+            </a:extLst>
+          </a:blip>
+          <a:stretch>
+            <a:fillRect/>
+          </a:stretch>
+        </p:blipFill>
+        <p:spPr>
+          <a:xfrm>
+            <a:off x="2465408" y="4085863"/>
+            <a:ext cx="6678592" cy="2436234"/>
           </a:xfrm>
           <a:prstGeom prst="rect">
             <a:avLst/>
@@ -3237,7 +3913,7 @@
         </p:nvSpPr>
         <p:spPr>
           <a:xfrm>
-            <a:off x="-373129" y="419654"/>
+            <a:off x="578362" y="419654"/>
             <a:ext cx="6918308" cy="461665"/>
           </a:xfrm>
           <a:prstGeom prst="rect">
@@ -3251,11 +3927,45 @@
           </a:bodyPr>
           <a:lstStyle/>
           <a:p>
-            <a:pPr lvl="2"/>
-            <a:r>
-              <a:rPr lang="es-CL" sz="2400" b="1" dirty="0"/>
-              <a:t>Ventajas del uso del VdF</a:t>
-            </a:r>
+            <a:r>
+              <a:rPr lang="en-US" sz="2400" b="1" spc="200" dirty="0" err="1">
+                <a:cs typeface="Roboto Medium"/>
+              </a:rPr>
+              <a:t>Falla</a:t>
+            </a:r>
+            <a:r>
+              <a:rPr lang="en-US" sz="2400" b="1" spc="200" dirty="0">
+                <a:cs typeface="Roboto Medium"/>
+              </a:rPr>
+              <a:t> entre </a:t>
+            </a:r>
+            <a:r>
+              <a:rPr lang="en-US" sz="2400" b="1" spc="200" dirty="0" err="1">
+                <a:cs typeface="Roboto Medium"/>
+              </a:rPr>
+              <a:t>espiras</a:t>
+            </a:r>
+            <a:r>
+              <a:rPr lang="en-US" sz="2400" b="1" spc="200" dirty="0">
+                <a:cs typeface="Roboto Medium"/>
+              </a:rPr>
+              <a:t> del </a:t>
+            </a:r>
+            <a:r>
+              <a:rPr lang="en-US" sz="2400" b="1" spc="200" dirty="0" err="1">
+                <a:cs typeface="Roboto Medium"/>
+              </a:rPr>
+              <a:t>Estator</a:t>
+            </a:r>
+            <a:r>
+              <a:rPr lang="en-US" sz="2400" b="1" spc="200" dirty="0">
+                <a:cs typeface="Roboto Medium"/>
+              </a:rPr>
+              <a:t> </a:t>
+            </a:r>
+            <a:endParaRPr lang="en-US" sz="2400" b="1" spc="200" dirty="0">
+              <a:cs typeface="Roboto Medium"/>
+            </a:endParaRPr>
           </a:p>
         </p:txBody>
       </p:sp>
@@ -3267,8 +3977,8 @@
         </p:nvSpPr>
         <p:spPr>
           <a:xfrm>
-            <a:off x="578362" y="1546455"/>
-            <a:ext cx="7795971" cy="3662541"/>
+            <a:off x="300570" y="1491983"/>
+            <a:ext cx="7795971" cy="3939540"/>
           </a:xfrm>
           <a:prstGeom prst="rect">
             <a:avLst/>
@@ -3286,24 +3996,36 @@
               <a:buChar char="•"/>
             </a:pPr>
             <a:r>
-              <a:rPr lang="it-IT" dirty="0" smtClean="0">
-                <a:solidFill>
-                  <a:schemeClr val="tx2">
-                    <a:lumMod val="75000"/>
-                  </a:schemeClr>
-                </a:solidFill>
-                <a:latin typeface="Roboto Light"/>
-                <a:cs typeface="Roboto Light"/>
-              </a:rPr>
-              <a:t>Se evitan sobrecorrientes</a:t>
-            </a:r>
-          </a:p>
-          <a:p>
-            <a:pPr marL="285750" indent="-285750">
-              <a:buFont typeface="Arial"/>
-              <a:buChar char="•"/>
-            </a:pPr>
-            <a:endParaRPr lang="it-IT" dirty="0" smtClean="0">
+              <a:rPr lang="it-IT" u="sng" dirty="0">
+                <a:solidFill>
+                  <a:schemeClr val="tx2">
+                    <a:lumMod val="75000"/>
+                  </a:schemeClr>
+                </a:solidFill>
+                <a:latin typeface="Roboto Light"/>
+                <a:cs typeface="Roboto Light"/>
+              </a:rPr>
+              <a:t>Formas de Onda</a:t>
+            </a:r>
+            <a:r>
+              <a:rPr lang="es-CL" dirty="0">
+                <a:solidFill>
+                  <a:schemeClr val="tx2">
+                    <a:lumMod val="75000"/>
+                  </a:schemeClr>
+                </a:solidFill>
+                <a:latin typeface="Roboto Light"/>
+                <a:cs typeface="Roboto Light"/>
+              </a:rPr>
+              <a:t>:</a:t>
+            </a:r>
+          </a:p>
+          <a:p>
+            <a:pPr marL="285750" indent="-285750">
+              <a:buFont typeface="Arial"/>
+              <a:buChar char="•"/>
+            </a:pPr>
+            <a:endParaRPr lang="es-CL" dirty="0">
               <a:solidFill>
                 <a:schemeClr val="tx2">
                   <a:lumMod val="75000"/>
@@ -3319,24 +4041,87 @@
               <a:buChar char="•"/>
             </a:pPr>
             <a:r>
-              <a:rPr lang="it-IT" dirty="0" smtClean="0">
-                <a:solidFill>
-                  <a:schemeClr val="tx2">
-                    <a:lumMod val="75000"/>
-                  </a:schemeClr>
-                </a:solidFill>
-                <a:latin typeface="Roboto Light"/>
-                <a:cs typeface="Roboto Light"/>
-              </a:rPr>
-              <a:t>Permite controlar plenamente las aceleraciones y frenados del motor, mediante uso de rampas de aceleración/desaceleración</a:t>
-            </a:r>
-          </a:p>
-          <a:p>
-            <a:pPr marL="285750" indent="-285750">
-              <a:buFont typeface="Arial"/>
-              <a:buChar char="•"/>
-            </a:pPr>
-            <a:endParaRPr lang="it-IT" dirty="0" smtClean="0">
+              <a:rPr lang="es-CL" dirty="0" smtClean="0">
+                <a:solidFill>
+                  <a:schemeClr val="tx2">
+                    <a:lumMod val="75000"/>
+                  </a:schemeClr>
+                </a:solidFill>
+                <a:latin typeface="Roboto Light"/>
+                <a:cs typeface="Roboto Light"/>
+              </a:rPr>
+              <a:t>Torque:</a:t>
+            </a:r>
+            <a:br>
+              <a:rPr lang="es-CL" dirty="0" smtClean="0">
+                <a:solidFill>
+                  <a:schemeClr val="tx2">
+                    <a:lumMod val="75000"/>
+                  </a:schemeClr>
+                </a:solidFill>
+                <a:latin typeface="Roboto Light"/>
+                <a:cs typeface="Roboto Light"/>
+              </a:rPr>
+            </a:br>
+            <a:r>
+              <a:rPr lang="es-CL" dirty="0" smtClean="0">
+                <a:solidFill>
+                  <a:schemeClr val="tx2">
+                    <a:lumMod val="75000"/>
+                  </a:schemeClr>
+                </a:solidFill>
+                <a:latin typeface="Roboto Light"/>
+                <a:cs typeface="Roboto Light"/>
+              </a:rPr>
+              <a:t>queda oscilando</a:t>
+            </a:r>
+            <a:br>
+              <a:rPr lang="es-CL" dirty="0" smtClean="0">
+                <a:solidFill>
+                  <a:schemeClr val="tx2">
+                    <a:lumMod val="75000"/>
+                  </a:schemeClr>
+                </a:solidFill>
+                <a:latin typeface="Roboto Light"/>
+                <a:cs typeface="Roboto Light"/>
+              </a:rPr>
+            </a:br>
+            <a:r>
+              <a:rPr lang="es-CL" dirty="0" smtClean="0">
+                <a:solidFill>
+                  <a:schemeClr val="tx2">
+                    <a:lumMod val="75000"/>
+                  </a:schemeClr>
+                </a:solidFill>
+                <a:latin typeface="Roboto Light"/>
+                <a:cs typeface="Roboto Light"/>
+              </a:rPr>
+              <a:t>post-falla</a:t>
+            </a:r>
+            <a:r>
+              <a:rPr lang="es-CL" dirty="0">
+                <a:solidFill>
+                  <a:schemeClr val="tx2">
+                    <a:lumMod val="75000"/>
+                  </a:schemeClr>
+                </a:solidFill>
+                <a:latin typeface="Roboto Light"/>
+                <a:cs typeface="Roboto Light"/>
+              </a:rPr>
+              <a:t/>
+            </a:r>
+            <a:br>
+              <a:rPr lang="es-CL" dirty="0">
+                <a:solidFill>
+                  <a:schemeClr val="tx2">
+                    <a:lumMod val="75000"/>
+                  </a:schemeClr>
+                </a:solidFill>
+                <a:latin typeface="Roboto Light"/>
+                <a:cs typeface="Roboto Light"/>
+              </a:rPr>
+            </a:br>
+            <a:endParaRPr lang="es-CL" dirty="0">
               <a:solidFill>
                 <a:schemeClr val="tx2">
                   <a:lumMod val="75000"/>
@@ -3351,25 +4136,7 @@
               <a:buFont typeface="Arial"/>
               <a:buChar char="•"/>
             </a:pPr>
-            <a:r>
-              <a:rPr lang="it-IT" dirty="0" smtClean="0">
-                <a:solidFill>
-                  <a:schemeClr val="tx2">
-                    <a:lumMod val="75000"/>
-                  </a:schemeClr>
-                </a:solidFill>
-                <a:latin typeface="Roboto Light"/>
-                <a:cs typeface="Roboto Light"/>
-              </a:rPr>
-              <a:t>Proteje al motor y la carga de eventos de la red de alimentación</a:t>
-            </a:r>
-          </a:p>
-          <a:p>
-            <a:pPr marL="285750" indent="-285750">
-              <a:buFont typeface="Arial"/>
-              <a:buChar char="•"/>
-            </a:pPr>
-            <a:endParaRPr lang="it-IT" dirty="0">
+            <a:endParaRPr lang="es-CL" dirty="0">
               <a:solidFill>
                 <a:schemeClr val="tx2">
                   <a:lumMod val="75000"/>
@@ -3384,25 +4151,7 @@
               <a:buFont typeface="Arial"/>
               <a:buChar char="•"/>
             </a:pPr>
-            <a:r>
-              <a:rPr lang="it-IT" dirty="0" smtClean="0">
-                <a:solidFill>
-                  <a:schemeClr val="tx2">
-                    <a:lumMod val="75000"/>
-                  </a:schemeClr>
-                </a:solidFill>
-                <a:latin typeface="Roboto Light"/>
-                <a:cs typeface="Roboto Light"/>
-              </a:rPr>
-              <a:t>Entrega la energía dosificada y de forma óptima</a:t>
-            </a:r>
-          </a:p>
-          <a:p>
-            <a:pPr marL="285750" indent="-285750">
-              <a:buFont typeface="Arial"/>
-              <a:buChar char="•"/>
-            </a:pPr>
-            <a:endParaRPr lang="it-IT" dirty="0">
+            <a:endParaRPr lang="es-CL" dirty="0">
               <a:solidFill>
                 <a:schemeClr val="tx2">
                   <a:lumMod val="75000"/>
@@ -3417,18 +4166,115 @@
               <a:buFont typeface="Arial"/>
               <a:buChar char="•"/>
             </a:pPr>
-            <a:r>
-              <a:rPr lang="it-IT" dirty="0" smtClean="0">
-                <a:solidFill>
-                  <a:schemeClr val="tx2">
-                    <a:lumMod val="75000"/>
-                  </a:schemeClr>
-                </a:solidFill>
-                <a:latin typeface="Roboto Light"/>
-                <a:cs typeface="Roboto Light"/>
-              </a:rPr>
-              <a:t>Da mayor vida útil al motor, debido a que los devanados no experimentan sobrecorrientes, por tanto la aislación no  sufre daños por sobre temperatura</a:t>
-            </a:r>
+            <a:endParaRPr lang="es-CL" dirty="0">
+              <a:solidFill>
+                <a:schemeClr val="tx2">
+                  <a:lumMod val="75000"/>
+                </a:schemeClr>
+              </a:solidFill>
+              <a:latin typeface="Roboto Light"/>
+              <a:cs typeface="Roboto Light"/>
+            </a:endParaRPr>
+          </a:p>
+          <a:p>
+            <a:endParaRPr lang="es-CL" dirty="0">
+              <a:solidFill>
+                <a:schemeClr val="tx2">
+                  <a:lumMod val="75000"/>
+                </a:schemeClr>
+              </a:solidFill>
+              <a:latin typeface="Roboto Light"/>
+              <a:cs typeface="Roboto Light"/>
+            </a:endParaRPr>
+          </a:p>
+          <a:p>
+            <a:pPr marL="285750" indent="-285750">
+              <a:buFont typeface="Arial"/>
+              <a:buChar char="•"/>
+            </a:pPr>
+            <a:endParaRPr lang="es-CL" dirty="0">
+              <a:solidFill>
+                <a:schemeClr val="tx2">
+                  <a:lumMod val="75000"/>
+                </a:schemeClr>
+              </a:solidFill>
+              <a:latin typeface="Roboto Light"/>
+              <a:cs typeface="Roboto Light"/>
+            </a:endParaRPr>
+          </a:p>
+          <a:p>
+            <a:pPr marL="285750" indent="-285750">
+              <a:buFont typeface="Arial"/>
+              <a:buChar char="•"/>
+            </a:pPr>
+            <a:r>
+              <a:rPr lang="es-CL" dirty="0" smtClean="0">
+                <a:solidFill>
+                  <a:schemeClr val="tx2">
+                    <a:lumMod val="75000"/>
+                  </a:schemeClr>
+                </a:solidFill>
+                <a:latin typeface="Roboto Light"/>
+                <a:cs typeface="Roboto Light"/>
+              </a:rPr>
+              <a:t>Corriente 0.6 a 1[s</a:t>
+            </a:r>
+            <a:r>
+              <a:rPr lang="en-US" dirty="0" smtClean="0">
+                <a:solidFill>
+                  <a:schemeClr val="tx2">
+                    <a:lumMod val="75000"/>
+                  </a:schemeClr>
+                </a:solidFill>
+                <a:latin typeface="Roboto Light"/>
+                <a:cs typeface="Roboto Light"/>
+              </a:rPr>
+              <a:t>]</a:t>
+            </a:r>
+            <a:r>
+              <a:rPr lang="es-CL" dirty="0" smtClean="0">
+                <a:solidFill>
+                  <a:schemeClr val="tx2">
+                    <a:lumMod val="75000"/>
+                  </a:schemeClr>
+                </a:solidFill>
+                <a:latin typeface="Roboto Light"/>
+                <a:cs typeface="Roboto Light"/>
+              </a:rPr>
+              <a:t>:</a:t>
+            </a:r>
+            <a:br>
+              <a:rPr lang="es-CL" dirty="0" smtClean="0">
+                <a:solidFill>
+                  <a:schemeClr val="tx2">
+                    <a:lumMod val="75000"/>
+                  </a:schemeClr>
+                </a:solidFill>
+                <a:latin typeface="Roboto Light"/>
+                <a:cs typeface="Roboto Light"/>
+              </a:rPr>
+            </a:br>
+            <a:r>
+              <a:rPr lang="es-CL" dirty="0" smtClean="0">
+                <a:solidFill>
+                  <a:schemeClr val="tx2">
+                    <a:lumMod val="75000"/>
+                  </a:schemeClr>
+                </a:solidFill>
+                <a:latin typeface="Roboto Light"/>
+                <a:cs typeface="Roboto Light"/>
+              </a:rPr>
+              <a:t>Zoom </a:t>
+            </a:r>
+            <a:endParaRPr lang="en-US" dirty="0">
+              <a:solidFill>
+                <a:schemeClr val="tx2">
+                  <a:lumMod val="75000"/>
+                </a:schemeClr>
+              </a:solidFill>
+              <a:latin typeface="Roboto Light"/>
+              <a:cs typeface="Roboto Light"/>
+            </a:endParaRPr>
           </a:p>
           <a:p>
             <a:pPr marL="285750" indent="-285750">
@@ -3509,6 +4355,66 @@
           <a:xfrm>
             <a:off x="6240435" y="6596185"/>
             <a:ext cx="2133898" cy="240280"/>
+          </a:xfrm>
+          <a:prstGeom prst="rect">
+            <a:avLst/>
+          </a:prstGeom>
+        </p:spPr>
+      </p:pic>
+      <p:pic>
+        <p:nvPicPr>
+          <p:cNvPr id="2" name="Imagen 1"/>
+          <p:cNvPicPr>
+            <a:picLocks noChangeAspect="1"/>
+          </p:cNvPicPr>
+          <p:nvPr/>
+        </p:nvPicPr>
+        <p:blipFill>
+          <a:blip r:embed="rId3">
+            <a:extLst>
+              <a:ext uri="{28A0092B-C50C-407E-A947-70E740481C1C}">
+                <a14:useLocalDpi xmlns:a14="http://schemas.microsoft.com/office/drawing/2010/main" val="0"/>
+              </a:ext>
+            </a:extLst>
+          </a:blip>
+          <a:stretch>
+            <a:fillRect/>
+          </a:stretch>
+        </p:blipFill>
+        <p:spPr>
+          <a:xfrm>
+            <a:off x="2745542" y="1283170"/>
+            <a:ext cx="6398458" cy="2617261"/>
+          </a:xfrm>
+          <a:prstGeom prst="rect">
+            <a:avLst/>
+          </a:prstGeom>
+        </p:spPr>
+      </p:pic>
+      <p:pic>
+        <p:nvPicPr>
+          <p:cNvPr id="3" name="Imagen 2"/>
+          <p:cNvPicPr>
+            <a:picLocks noChangeAspect="1"/>
+          </p:cNvPicPr>
+          <p:nvPr/>
+        </p:nvPicPr>
+        <p:blipFill>
+          <a:blip r:embed="rId4">
+            <a:extLst>
+              <a:ext uri="{28A0092B-C50C-407E-A947-70E740481C1C}">
+                <a14:useLocalDpi xmlns:a14="http://schemas.microsoft.com/office/drawing/2010/main" val="0"/>
+              </a:ext>
+            </a:extLst>
+          </a:blip>
+          <a:stretch>
+            <a:fillRect/>
+          </a:stretch>
+        </p:blipFill>
+        <p:spPr>
+          <a:xfrm>
+            <a:off x="2745542" y="3970116"/>
+            <a:ext cx="6398458" cy="2626069"/>
           </a:xfrm>
           <a:prstGeom prst="rect">
             <a:avLst/>
@@ -3560,7 +4466,7 @@
         </p:nvSpPr>
         <p:spPr>
           <a:xfrm>
-            <a:off x="-84372" y="366153"/>
+            <a:off x="456646" y="366153"/>
             <a:ext cx="6918308" cy="461665"/>
           </a:xfrm>
           <a:prstGeom prst="rect">
@@ -3574,11 +4480,45 @@
           </a:bodyPr>
           <a:lstStyle/>
           <a:p>
-            <a:pPr lvl="1"/>
-            <a:r>
-              <a:rPr lang="es-CL" sz="2400" b="1" dirty="0"/>
-              <a:t>Registrador de Variables Eléctricas SAMTE</a:t>
-            </a:r>
+            <a:r>
+              <a:rPr lang="en-US" sz="2400" b="1" spc="200" dirty="0" err="1">
+                <a:cs typeface="Roboto Medium"/>
+              </a:rPr>
+              <a:t>Falla</a:t>
+            </a:r>
+            <a:r>
+              <a:rPr lang="en-US" sz="2400" b="1" spc="200" dirty="0">
+                <a:cs typeface="Roboto Medium"/>
+              </a:rPr>
+              <a:t> entre </a:t>
+            </a:r>
+            <a:r>
+              <a:rPr lang="en-US" sz="2400" b="1" spc="200" dirty="0" err="1">
+                <a:cs typeface="Roboto Medium"/>
+              </a:rPr>
+              <a:t>espiras</a:t>
+            </a:r>
+            <a:r>
+              <a:rPr lang="en-US" sz="2400" b="1" spc="200" dirty="0">
+                <a:cs typeface="Roboto Medium"/>
+              </a:rPr>
+              <a:t> del </a:t>
+            </a:r>
+            <a:r>
+              <a:rPr lang="en-US" sz="2400" b="1" spc="200" dirty="0" err="1">
+                <a:cs typeface="Roboto Medium"/>
+              </a:rPr>
+              <a:t>Estator</a:t>
+            </a:r>
+            <a:r>
+              <a:rPr lang="en-US" sz="2400" b="1" spc="200" dirty="0">
+                <a:cs typeface="Roboto Medium"/>
+              </a:rPr>
+              <a:t> </a:t>
+            </a:r>
+            <a:endParaRPr lang="en-US" sz="2400" b="1" spc="200" dirty="0">
+              <a:cs typeface="Roboto Medium"/>
+            </a:endParaRPr>
           </a:p>
         </p:txBody>
       </p:sp>
@@ -3590,8 +4530,8 @@
         </p:nvSpPr>
         <p:spPr>
           <a:xfrm>
-            <a:off x="313668" y="827818"/>
-            <a:ext cx="8469384" cy="3785652"/>
+            <a:off x="6655443" y="1447291"/>
+            <a:ext cx="8469384" cy="3046988"/>
           </a:xfrm>
           <a:prstGeom prst="rect">
             <a:avLst/>
@@ -3609,17 +4549,79 @@
               <a:buChar char="•"/>
             </a:pPr>
             <a:r>
-              <a:rPr lang="es-CL" sz="1600" dirty="0">
-                <a:solidFill>
-                  <a:schemeClr val="tx2">
-                    <a:lumMod val="75000"/>
-                  </a:schemeClr>
-                </a:solidFill>
-                <a:latin typeface="Roboto Light"/>
-                <a:cs typeface="Roboto Light"/>
-              </a:rPr>
-              <a:t>Sistema Adquisición y Medición de Transientes </a:t>
-            </a:r>
+              <a:rPr lang="es-CL" sz="1600" u="sng" dirty="0" smtClean="0">
+                <a:solidFill>
+                  <a:schemeClr val="tx2">
+                    <a:lumMod val="75000"/>
+                  </a:schemeClr>
+                </a:solidFill>
+                <a:latin typeface="Roboto Light"/>
+              </a:rPr>
+              <a:t>FFT corriente </a:t>
+            </a:r>
+            <a:r>
+              <a:rPr lang="es-CL" sz="1600" u="sng" dirty="0">
+                <a:solidFill>
+                  <a:schemeClr val="tx2">
+                    <a:lumMod val="75000"/>
+                  </a:schemeClr>
+                </a:solidFill>
+                <a:latin typeface="Roboto Light"/>
+              </a:rPr>
+              <a:t>Fase </a:t>
+            </a:r>
+            <a:r>
+              <a:rPr lang="es-CL" sz="1600" u="sng" dirty="0" smtClean="0">
+                <a:solidFill>
+                  <a:schemeClr val="tx2">
+                    <a:lumMod val="75000"/>
+                  </a:schemeClr>
+                </a:solidFill>
+                <a:latin typeface="Roboto Light"/>
+              </a:rPr>
+              <a:t>A</a:t>
+            </a:r>
+            <a:br>
+              <a:rPr lang="es-CL" sz="1600" u="sng" dirty="0" smtClean="0">
+                <a:solidFill>
+                  <a:schemeClr val="tx2">
+                    <a:lumMod val="75000"/>
+                  </a:schemeClr>
+                </a:solidFill>
+                <a:latin typeface="Roboto Light"/>
+              </a:rPr>
+            </a:br>
+            <a:r>
+              <a:rPr lang="es-CL" sz="1600" u="sng" dirty="0" smtClean="0">
+                <a:solidFill>
+                  <a:schemeClr val="tx2">
+                    <a:lumMod val="75000"/>
+                  </a:schemeClr>
+                </a:solidFill>
+                <a:latin typeface="Roboto Light"/>
+              </a:rPr>
+              <a:t>estator</a:t>
+            </a:r>
+          </a:p>
+          <a:p>
+            <a:pPr marL="285750" indent="-285750">
+              <a:buFont typeface="Arial"/>
+              <a:buChar char="•"/>
+            </a:pPr>
+            <a:endParaRPr lang="es-CL" sz="1600" dirty="0" smtClean="0">
+              <a:solidFill>
+                <a:schemeClr val="tx2">
+                  <a:lumMod val="75000"/>
+                </a:schemeClr>
+              </a:solidFill>
+              <a:latin typeface="Roboto Light"/>
+            </a:endParaRPr>
+          </a:p>
+          <a:p>
+            <a:pPr marL="285750" indent="-285750">
+              <a:buFont typeface="Arial"/>
+              <a:buChar char="•"/>
+            </a:pPr>
             <a:r>
               <a:rPr lang="es-CL" sz="1600" dirty="0" smtClean="0">
                 <a:solidFill>
@@ -3628,156 +4630,8 @@
                   </a:schemeClr>
                 </a:solidFill>
                 <a:latin typeface="Roboto Light"/>
-                <a:cs typeface="Roboto Light"/>
-              </a:rPr>
-              <a:t>Eléctricas</a:t>
-            </a:r>
-          </a:p>
-          <a:p>
-            <a:pPr marL="285750" indent="-285750">
-              <a:buFont typeface="Arial"/>
-              <a:buChar char="•"/>
-            </a:pPr>
-            <a:endParaRPr lang="it-IT" sz="1600" dirty="0" smtClean="0">
-              <a:solidFill>
-                <a:schemeClr val="tx2">
-                  <a:lumMod val="75000"/>
-                </a:schemeClr>
-              </a:solidFill>
-              <a:latin typeface="Roboto Light"/>
-              <a:cs typeface="Roboto Light"/>
-            </a:endParaRPr>
-          </a:p>
-          <a:p>
-            <a:pPr marL="285750" indent="-285750">
-              <a:buFont typeface="Arial"/>
-              <a:buChar char="•"/>
-            </a:pPr>
-            <a:r>
-              <a:rPr lang="it-IT" sz="1600" dirty="0" smtClean="0">
-                <a:solidFill>
-                  <a:schemeClr val="tx2">
-                    <a:lumMod val="75000"/>
-                  </a:schemeClr>
-                </a:solidFill>
-                <a:latin typeface="Roboto Light"/>
-                <a:cs typeface="Roboto Light"/>
-              </a:rPr>
-              <a:t>Compuesto por una unidad electrónica y un notebook</a:t>
-            </a:r>
-          </a:p>
-          <a:p>
-            <a:pPr marL="285750" indent="-285750">
-              <a:buFont typeface="Arial"/>
-              <a:buChar char="•"/>
-            </a:pPr>
-            <a:endParaRPr lang="it-IT" sz="1600" dirty="0" smtClean="0">
-              <a:solidFill>
-                <a:schemeClr val="tx2">
-                  <a:lumMod val="75000"/>
-                </a:schemeClr>
-              </a:solidFill>
-              <a:latin typeface="Roboto Light"/>
-              <a:cs typeface="Roboto Light"/>
-            </a:endParaRPr>
-          </a:p>
-          <a:p>
-            <a:pPr marL="285750" indent="-285750">
-              <a:buFont typeface="Arial"/>
-              <a:buChar char="•"/>
-            </a:pPr>
-            <a:r>
-              <a:rPr lang="es-CL" sz="1600" dirty="0" smtClean="0">
-                <a:solidFill>
-                  <a:schemeClr val="tx2">
-                    <a:lumMod val="75000"/>
-                  </a:schemeClr>
-                </a:solidFill>
-                <a:latin typeface="Roboto Light"/>
-                <a:cs typeface="Roboto Light"/>
-              </a:rPr>
-              <a:t>Tres </a:t>
-            </a:r>
-            <a:r>
-              <a:rPr lang="es-CL" sz="1600" dirty="0">
-                <a:solidFill>
-                  <a:schemeClr val="tx2">
-                    <a:lumMod val="75000"/>
-                  </a:schemeClr>
-                </a:solidFill>
-                <a:latin typeface="Roboto Light"/>
-                <a:cs typeface="Roboto Light"/>
-              </a:rPr>
-              <a:t>canales de tensión (fases R, S y T) y cuatro de corriente (fases R, S, T y neutro). Los primeros tienen un rango de 400 [V rms], y los segundos disponen de rangos de 5 y 25 [A rms</a:t>
-            </a:r>
-            <a:r>
-              <a:rPr lang="es-CL" sz="1600" dirty="0" smtClean="0">
-                <a:solidFill>
-                  <a:schemeClr val="tx2">
-                    <a:lumMod val="75000"/>
-                  </a:schemeClr>
-                </a:solidFill>
-                <a:latin typeface="Roboto Light"/>
-                <a:cs typeface="Roboto Light"/>
-              </a:rPr>
-              <a:t>]</a:t>
-            </a:r>
-          </a:p>
-          <a:p>
-            <a:pPr marL="285750" indent="-285750">
-              <a:buFont typeface="Arial"/>
-              <a:buChar char="•"/>
-            </a:pPr>
-            <a:endParaRPr lang="es-CL" sz="1600" dirty="0">
-              <a:solidFill>
-                <a:schemeClr val="tx2">
-                  <a:lumMod val="75000"/>
-                </a:schemeClr>
-              </a:solidFill>
-              <a:latin typeface="Roboto Light"/>
-              <a:cs typeface="Roboto Light"/>
-            </a:endParaRPr>
-          </a:p>
-          <a:p>
-            <a:pPr marL="285750" indent="-285750">
-              <a:buFont typeface="Arial"/>
-              <a:buChar char="•"/>
-            </a:pPr>
-            <a:r>
-              <a:rPr lang="es-CL" sz="1600" dirty="0" smtClean="0">
-                <a:solidFill>
-                  <a:schemeClr val="tx2">
-                    <a:lumMod val="75000"/>
-                  </a:schemeClr>
-                </a:solidFill>
-                <a:latin typeface="Roboto Light"/>
-                <a:cs typeface="Roboto Light"/>
-              </a:rPr>
-              <a:t>Permite </a:t>
-            </a:r>
-            <a:r>
-              <a:rPr lang="es-CL" sz="1600" dirty="0">
-                <a:solidFill>
-                  <a:schemeClr val="tx2">
-                    <a:lumMod val="75000"/>
-                  </a:schemeClr>
-                </a:solidFill>
-                <a:latin typeface="Roboto Light"/>
-                <a:cs typeface="Roboto Light"/>
-              </a:rPr>
-              <a:t>visualizar formas de onda y contenido armónico de las tensiones y las corrientes, capturar y visualizar transientes, medir frecuencia, valores RMS, potencias activas, reactivas, aparentes</a:t>
-            </a:r>
-            <a:r>
-              <a:rPr lang="es-CL" sz="1600" dirty="0" smtClean="0">
-                <a:solidFill>
-                  <a:schemeClr val="tx2">
-                    <a:lumMod val="75000"/>
-                  </a:schemeClr>
-                </a:solidFill>
-                <a:latin typeface="Roboto Light"/>
-                <a:cs typeface="Roboto Light"/>
-              </a:rPr>
-              <a:t>,</a:t>
+              </a:rPr>
+              <a:t>Desde 1.1 [s]</a:t>
             </a:r>
             <a:br>
               <a:rPr lang="es-CL" sz="1600" dirty="0" smtClean="0">
@@ -3787,7 +4641,6 @@
                   </a:schemeClr>
                 </a:solidFill>
                 <a:latin typeface="Roboto Light"/>
-                <a:cs typeface="Roboto Light"/>
               </a:rPr>
             </a:br>
             <a:r>
@@ -3798,22 +4651,37 @@
                   </a:schemeClr>
                 </a:solidFill>
                 <a:latin typeface="Roboto Light"/>
-                <a:cs typeface="Roboto Light"/>
-              </a:rPr>
-              <a:t>medir </a:t>
-            </a:r>
-            <a:r>
-              <a:rPr lang="es-CL" sz="1600" dirty="0">
-                <a:solidFill>
-                  <a:schemeClr val="tx2">
-                    <a:lumMod val="75000"/>
-                  </a:schemeClr>
-                </a:solidFill>
-                <a:latin typeface="Roboto Light"/>
-                <a:cs typeface="Roboto Light"/>
-              </a:rPr>
-              <a:t>componentes </a:t>
-            </a:r>
+              </a:rPr>
+              <a:t>10 ciclos</a:t>
+            </a:r>
+            <a:endParaRPr lang="es-CL" sz="1600" dirty="0">
+              <a:solidFill>
+                <a:schemeClr val="tx2">
+                  <a:lumMod val="75000"/>
+                </a:schemeClr>
+              </a:solidFill>
+              <a:latin typeface="Roboto Light"/>
+            </a:endParaRPr>
+          </a:p>
+          <a:p>
+            <a:pPr marL="285750" indent="-285750">
+              <a:buFont typeface="Arial"/>
+              <a:buChar char="•"/>
+            </a:pPr>
+            <a:endParaRPr lang="es-CL" sz="1600" dirty="0">
+              <a:solidFill>
+                <a:schemeClr val="tx2">
+                  <a:lumMod val="75000"/>
+                </a:schemeClr>
+              </a:solidFill>
+              <a:latin typeface="Roboto Light"/>
+            </a:endParaRPr>
+          </a:p>
+          <a:p>
+            <a:pPr marL="285750" indent="-285750">
+              <a:buFont typeface="Arial"/>
+              <a:buChar char="•"/>
+            </a:pPr>
             <a:r>
               <a:rPr lang="es-CL" sz="1600" dirty="0" smtClean="0">
                 <a:solidFill>
@@ -3822,68 +4690,8 @@
                   </a:schemeClr>
                 </a:solidFill>
                 <a:latin typeface="Roboto Light"/>
-                <a:cs typeface="Roboto Light"/>
-              </a:rPr>
-              <a:t>simétricas</a:t>
-            </a:r>
-            <a:r>
-              <a:rPr lang="es-CL" sz="1600" dirty="0">
-                <a:solidFill>
-                  <a:schemeClr val="tx2">
-                    <a:lumMod val="75000"/>
-                  </a:schemeClr>
-                </a:solidFill>
-                <a:latin typeface="Roboto Light"/>
-                <a:cs typeface="Roboto Light"/>
-              </a:rPr>
-              <a:t/>
-            </a:r>
-            <a:br>
-              <a:rPr lang="es-CL" sz="1600" dirty="0">
-                <a:solidFill>
-                  <a:schemeClr val="tx2">
-                    <a:lumMod val="75000"/>
-                  </a:schemeClr>
-                </a:solidFill>
-                <a:latin typeface="Roboto Light"/>
-                <a:cs typeface="Roboto Light"/>
-              </a:rPr>
-            </a:br>
-            <a:r>
-              <a:rPr lang="es-CL" sz="1600" dirty="0" smtClean="0">
-                <a:solidFill>
-                  <a:schemeClr val="tx2">
-                    <a:lumMod val="75000"/>
-                  </a:schemeClr>
-                </a:solidFill>
-                <a:latin typeface="Roboto Light"/>
-                <a:cs typeface="Roboto Light"/>
-              </a:rPr>
-              <a:t>factores </a:t>
-            </a:r>
-            <a:r>
-              <a:rPr lang="es-CL" sz="1600" dirty="0">
-                <a:solidFill>
-                  <a:schemeClr val="tx2">
-                    <a:lumMod val="75000"/>
-                  </a:schemeClr>
-                </a:solidFill>
-                <a:latin typeface="Roboto Light"/>
-                <a:cs typeface="Roboto Light"/>
-              </a:rPr>
-              <a:t>de potencia y el </a:t>
-            </a:r>
-            <a:r>
-              <a:rPr lang="es-CL" sz="1600" dirty="0" smtClean="0">
-                <a:solidFill>
-                  <a:schemeClr val="tx2">
-                    <a:lumMod val="75000"/>
-                  </a:schemeClr>
-                </a:solidFill>
-                <a:latin typeface="Roboto Light"/>
-                <a:cs typeface="Roboto Light"/>
-              </a:rPr>
-              <a:t>nivel</a:t>
+              </a:rPr>
+              <a:t>Prácticamente</a:t>
             </a:r>
             <a:br>
               <a:rPr lang="es-CL" sz="1600" dirty="0" smtClean="0">
@@ -3893,7 +4701,6 @@
                   </a:schemeClr>
                 </a:solidFill>
                 <a:latin typeface="Roboto Light"/>
-                <a:cs typeface="Roboto Light"/>
               </a:rPr>
             </a:br>
             <a:r>
@@ -3904,33 +4711,8 @@
                   </a:schemeClr>
                 </a:solidFill>
                 <a:latin typeface="Roboto Light"/>
-                <a:cs typeface="Roboto Light"/>
-              </a:rPr>
-              <a:t>de </a:t>
-            </a:r>
-            <a:r>
-              <a:rPr lang="es-CL" sz="1600" dirty="0">
-                <a:solidFill>
-                  <a:schemeClr val="tx2">
-                    <a:lumMod val="75000"/>
-                  </a:schemeClr>
-                </a:solidFill>
-                <a:latin typeface="Roboto Light"/>
-                <a:cs typeface="Roboto Light"/>
-              </a:rPr>
-              <a:t>distorsión armónica de </a:t>
-            </a:r>
-            <a:r>
-              <a:rPr lang="es-CL" sz="1600" dirty="0" smtClean="0">
-                <a:solidFill>
-                  <a:schemeClr val="tx2">
-                    <a:lumMod val="75000"/>
-                  </a:schemeClr>
-                </a:solidFill>
-                <a:latin typeface="Roboto Light"/>
-                <a:cs typeface="Roboto Light"/>
-              </a:rPr>
-              <a:t>las</a:t>
+              </a:rPr>
+              <a:t>sinusoidal</a:t>
             </a:r>
             <a:br>
               <a:rPr lang="es-CL" sz="1600" dirty="0" smtClean="0">
@@ -3940,9 +4722,22 @@
                   </a:schemeClr>
                 </a:solidFill>
                 <a:latin typeface="Roboto Light"/>
-                <a:cs typeface="Roboto Light"/>
               </a:rPr>
             </a:br>
+            <a:endParaRPr lang="es-CL" sz="1600" dirty="0" smtClean="0">
+              <a:solidFill>
+                <a:schemeClr val="tx2">
+                  <a:lumMod val="75000"/>
+                </a:schemeClr>
+              </a:solidFill>
+              <a:latin typeface="Roboto Light"/>
+            </a:endParaRPr>
+          </a:p>
+          <a:p>
+            <a:pPr marL="285750" indent="-285750">
+              <a:buFont typeface="Arial"/>
+              <a:buChar char="•"/>
+            </a:pPr>
             <a:r>
               <a:rPr lang="es-CL" sz="1600" dirty="0" smtClean="0">
                 <a:solidFill>
@@ -3951,18 +4746,40 @@
                   </a:schemeClr>
                 </a:solidFill>
                 <a:latin typeface="Roboto Light"/>
-                <a:cs typeface="Roboto Light"/>
-              </a:rPr>
-              <a:t>variables</a:t>
-            </a:r>
-            <a:endParaRPr lang="en-US" sz="1600" dirty="0">
+              </a:rPr>
+              <a:t>THD=0.07%</a:t>
+            </a:r>
+            <a:br>
+              <a:rPr lang="es-CL" sz="1600" dirty="0" smtClean="0">
+                <a:solidFill>
+                  <a:schemeClr val="tx2">
+                    <a:lumMod val="75000"/>
+                  </a:schemeClr>
+                </a:solidFill>
+                <a:latin typeface="Roboto Light"/>
+              </a:rPr>
+            </a:br>
+            <a:endParaRPr lang="es-CL" sz="1600" dirty="0" smtClean="0">
               <a:solidFill>
                 <a:schemeClr val="tx2">
                   <a:lumMod val="75000"/>
                 </a:schemeClr>
               </a:solidFill>
               <a:latin typeface="Roboto Light"/>
-              <a:cs typeface="Roboto Light"/>
+            </a:endParaRPr>
+          </a:p>
+          <a:p>
+            <a:pPr marL="285750" indent="-285750">
+              <a:buFont typeface="Arial"/>
+              <a:buChar char="•"/>
+            </a:pPr>
+            <a:endParaRPr lang="es-CL" sz="1600" dirty="0">
+              <a:solidFill>
+                <a:schemeClr val="tx2">
+                  <a:lumMod val="75000"/>
+                </a:schemeClr>
+              </a:solidFill>
+              <a:latin typeface="Roboto Light"/>
             </a:endParaRPr>
           </a:p>
         </p:txBody>
@@ -4037,7 +4854,7 @@
       </p:pic>
       <p:pic>
         <p:nvPicPr>
-          <p:cNvPr id="2" name="Imagen 1"/>
+          <p:cNvPr id="7" name="Imagen 6"/>
           <p:cNvPicPr>
             <a:picLocks noChangeAspect="1"/>
           </p:cNvPicPr>
@@ -4057,38 +4874,8 @@
         </p:blipFill>
         <p:spPr>
           <a:xfrm>
-            <a:off x="4288924" y="3534935"/>
-            <a:ext cx="4592659" cy="2491517"/>
-          </a:xfrm>
-          <a:prstGeom prst="rect">
-            <a:avLst/>
-          </a:prstGeom>
-        </p:spPr>
-      </p:pic>
-      <p:pic>
-        <p:nvPicPr>
-          <p:cNvPr id="3" name="Imagen 2"/>
-          <p:cNvPicPr>
-            <a:picLocks noChangeAspect="1"/>
-          </p:cNvPicPr>
-          <p:nvPr/>
-        </p:nvPicPr>
-        <p:blipFill>
-          <a:blip r:embed="rId4">
-            <a:extLst>
-              <a:ext uri="{28A0092B-C50C-407E-A947-70E740481C1C}">
-                <a14:useLocalDpi xmlns:a14="http://schemas.microsoft.com/office/drawing/2010/main" val="0"/>
-              </a:ext>
-            </a:extLst>
-          </a:blip>
-          <a:stretch>
-            <a:fillRect/>
-          </a:stretch>
-        </p:blipFill>
-        <p:spPr>
-          <a:xfrm>
-            <a:off x="-1" y="4559968"/>
-            <a:ext cx="3915801" cy="2036217"/>
+            <a:off x="0" y="827818"/>
+            <a:ext cx="6655443" cy="5768367"/>
           </a:xfrm>
           <a:prstGeom prst="rect">
             <a:avLst/>
@@ -4140,7 +4927,7 @@
         </p:nvSpPr>
         <p:spPr>
           <a:xfrm>
-            <a:off x="-373129" y="419654"/>
+            <a:off x="578362" y="475051"/>
             <a:ext cx="6918308" cy="461665"/>
           </a:xfrm>
           <a:prstGeom prst="rect">
@@ -4154,11 +4941,45 @@
           </a:bodyPr>
           <a:lstStyle/>
           <a:p>
-            <a:pPr lvl="2"/>
-            <a:r>
-              <a:rPr lang="es-CL" sz="2400" b="1" dirty="0"/>
-              <a:t>Software Simulink de MATLAB</a:t>
-            </a:r>
+            <a:r>
+              <a:rPr lang="en-US" sz="2400" b="1" spc="200" dirty="0" err="1">
+                <a:cs typeface="Roboto Medium"/>
+              </a:rPr>
+              <a:t>Falla</a:t>
+            </a:r>
+            <a:r>
+              <a:rPr lang="en-US" sz="2400" b="1" spc="200" dirty="0">
+                <a:cs typeface="Roboto Medium"/>
+              </a:rPr>
+              <a:t> entre </a:t>
+            </a:r>
+            <a:r>
+              <a:rPr lang="en-US" sz="2400" b="1" spc="200" dirty="0" err="1">
+                <a:cs typeface="Roboto Medium"/>
+              </a:rPr>
+              <a:t>espiras</a:t>
+            </a:r>
+            <a:r>
+              <a:rPr lang="en-US" sz="2400" b="1" spc="200" dirty="0">
+                <a:cs typeface="Roboto Medium"/>
+              </a:rPr>
+              <a:t> del </a:t>
+            </a:r>
+            <a:r>
+              <a:rPr lang="en-US" sz="2400" b="1" spc="200" dirty="0" err="1">
+                <a:cs typeface="Roboto Medium"/>
+              </a:rPr>
+              <a:t>Estator</a:t>
+            </a:r>
+            <a:r>
+              <a:rPr lang="en-US" sz="2400" b="1" spc="200" dirty="0">
+                <a:cs typeface="Roboto Medium"/>
+              </a:rPr>
+              <a:t> </a:t>
+            </a:r>
+            <a:endParaRPr lang="en-US" sz="2400" b="1" spc="200" dirty="0">
+              <a:cs typeface="Roboto Medium"/>
+            </a:endParaRPr>
           </a:p>
         </p:txBody>
       </p:sp>
@@ -4189,18 +5010,6 @@
               <a:buChar char="•"/>
             </a:pPr>
             <a:r>
-              <a:rPr lang="es-CL" dirty="0">
-                <a:solidFill>
-                  <a:schemeClr val="tx2">
-                    <a:lumMod val="75000"/>
-                  </a:schemeClr>
-                </a:solidFill>
-                <a:latin typeface="Roboto Light"/>
-                <a:cs typeface="Roboto Light"/>
-              </a:rPr>
-              <a:t>MATLAB (abreviatura de MATrix LABoratory, "laboratorio de matrices") es una herramienta de software matemático, el cual cuenta con múltiples toolbox que trabajan sobre </a:t>
-            </a:r>
-            <a:r>
               <a:rPr lang="es-CL" dirty="0" smtClean="0">
                 <a:solidFill>
                   <a:schemeClr val="tx2">
@@ -4210,7 +5019,19 @@
                 <a:latin typeface="Roboto Light"/>
                 <a:cs typeface="Roboto Light"/>
               </a:rPr>
-              <a:t>este</a:t>
+              <a:t>Corrientes del estator post-falla no presentan distorsi</a:t>
+            </a:r>
+            <a:r>
+              <a:rPr lang="es-CL" dirty="0" smtClean="0">
+                <a:solidFill>
+                  <a:schemeClr val="tx2">
+                    <a:lumMod val="75000"/>
+                  </a:schemeClr>
+                </a:solidFill>
+                <a:latin typeface="Roboto Light"/>
+                <a:cs typeface="Roboto Light"/>
+              </a:rPr>
+              <a:t>ón, pero sí presentan desbalance:</a:t>
             </a:r>
           </a:p>
           <a:p>
@@ -4225,26 +5046,97 @@
                 </a:schemeClr>
               </a:solidFill>
               <a:latin typeface="Roboto Light"/>
-              <a:cs typeface="Roboto Light"/>
-            </a:endParaRPr>
-          </a:p>
-          <a:p>
-            <a:pPr marL="285750" indent="-285750">
-              <a:buFont typeface="Arial"/>
-              <a:buChar char="•"/>
-            </a:pPr>
-            <a:r>
-              <a:rPr lang="es-CL" dirty="0">
-                <a:solidFill>
-                  <a:schemeClr val="tx2">
-                    <a:lumMod val="75000"/>
-                  </a:schemeClr>
-                </a:solidFill>
-                <a:latin typeface="Roboto Light"/>
-                <a:cs typeface="Roboto Light"/>
-              </a:rPr>
-              <a:t>Simulink es un entorno de programación visual, que funciona sobre el entorno de programación </a:t>
-            </a:r>
+            </a:endParaRPr>
+          </a:p>
+          <a:p>
+            <a:pPr marL="285750" indent="-285750">
+              <a:buFont typeface="Arial"/>
+              <a:buChar char="•"/>
+            </a:pPr>
+            <a:endParaRPr lang="es-CL" dirty="0" smtClean="0">
+              <a:solidFill>
+                <a:schemeClr val="tx2">
+                  <a:lumMod val="75000"/>
+                </a:schemeClr>
+              </a:solidFill>
+              <a:latin typeface="Roboto Light"/>
+            </a:endParaRPr>
+          </a:p>
+          <a:p>
+            <a:pPr marL="285750" indent="-285750">
+              <a:buFont typeface="Arial"/>
+              <a:buChar char="•"/>
+            </a:pPr>
+            <a:endParaRPr lang="es-CL" dirty="0">
+              <a:solidFill>
+                <a:schemeClr val="tx2">
+                  <a:lumMod val="75000"/>
+                </a:schemeClr>
+              </a:solidFill>
+              <a:latin typeface="Roboto Light"/>
+            </a:endParaRPr>
+          </a:p>
+          <a:p>
+            <a:pPr marL="285750" indent="-285750">
+              <a:buFont typeface="Arial"/>
+              <a:buChar char="•"/>
+            </a:pPr>
+            <a:endParaRPr lang="es-CL" dirty="0" smtClean="0">
+              <a:solidFill>
+                <a:schemeClr val="tx2">
+                  <a:lumMod val="75000"/>
+                </a:schemeClr>
+              </a:solidFill>
+              <a:latin typeface="Roboto Light"/>
+            </a:endParaRPr>
+          </a:p>
+          <a:p>
+            <a:pPr marL="285750" indent="-285750">
+              <a:buFont typeface="Arial"/>
+              <a:buChar char="•"/>
+            </a:pPr>
+            <a:endParaRPr lang="es-CL" dirty="0">
+              <a:solidFill>
+                <a:schemeClr val="tx2">
+                  <a:lumMod val="75000"/>
+                </a:schemeClr>
+              </a:solidFill>
+              <a:latin typeface="Roboto Light"/>
+            </a:endParaRPr>
+          </a:p>
+          <a:p>
+            <a:pPr marL="285750" indent="-285750">
+              <a:buFont typeface="Arial"/>
+              <a:buChar char="•"/>
+            </a:pPr>
+            <a:endParaRPr lang="es-CL" dirty="0" smtClean="0">
+              <a:solidFill>
+                <a:schemeClr val="tx2">
+                  <a:lumMod val="75000"/>
+                </a:schemeClr>
+              </a:solidFill>
+              <a:latin typeface="Roboto Light"/>
+            </a:endParaRPr>
+          </a:p>
+          <a:p>
+            <a:pPr marL="285750" indent="-285750">
+              <a:buFont typeface="Arial"/>
+              <a:buChar char="•"/>
+            </a:pPr>
+            <a:endParaRPr lang="es-CL" dirty="0" smtClean="0">
+              <a:solidFill>
+                <a:schemeClr val="tx2">
+                  <a:lumMod val="75000"/>
+                </a:schemeClr>
+              </a:solidFill>
+              <a:latin typeface="Roboto Light"/>
+            </a:endParaRPr>
+          </a:p>
+          <a:p>
+            <a:pPr marL="285750" indent="-285750">
+              <a:buFont typeface="Arial"/>
+              <a:buChar char="•"/>
+            </a:pPr>
             <a:r>
               <a:rPr lang="es-CL" dirty="0" smtClean="0">
                 <a:solidFill>
@@ -4253,9 +5145,8 @@
                   </a:schemeClr>
                 </a:solidFill>
                 <a:latin typeface="Roboto Light"/>
-                <a:cs typeface="Roboto Light"/>
-              </a:rPr>
-              <a:t>MATLAB</a:t>
+              </a:rPr>
+              <a:t>Como es de esperarse la Fase C presenta mayor corriente, puesto que el cortocircuito reduce la impedancia total de esa fase.</a:t>
             </a:r>
           </a:p>
           <a:p>
@@ -4270,93 +5161,13 @@
                 </a:schemeClr>
               </a:solidFill>
               <a:latin typeface="Roboto Light"/>
-              <a:cs typeface="Roboto Light"/>
-            </a:endParaRPr>
-          </a:p>
-          <a:p>
-            <a:pPr marL="285750" indent="-285750">
-              <a:buFont typeface="Arial"/>
-              <a:buChar char="•"/>
-            </a:pPr>
-            <a:r>
-              <a:rPr lang="es-CL" dirty="0" smtClean="0">
-                <a:solidFill>
-                  <a:schemeClr val="tx2">
-                    <a:lumMod val="75000"/>
-                  </a:schemeClr>
-                </a:solidFill>
-                <a:latin typeface="Roboto Light"/>
-                <a:cs typeface="Roboto Light"/>
-              </a:rPr>
-              <a:t>Será </a:t>
-            </a:r>
-            <a:r>
-              <a:rPr lang="es-CL" dirty="0">
-                <a:solidFill>
-                  <a:schemeClr val="tx2">
-                    <a:lumMod val="75000"/>
-                  </a:schemeClr>
-                </a:solidFill>
-                <a:latin typeface="Roboto Light"/>
-                <a:cs typeface="Roboto Light"/>
-              </a:rPr>
-              <a:t>utilizado para modelar y simular las situaciones de estudio mediante diagramas de bloque, estos bloques se obtienen de la </a:t>
-            </a:r>
-            <a:r>
-              <a:rPr lang="es-CL" dirty="0" smtClean="0">
-                <a:solidFill>
-                  <a:schemeClr val="tx2">
-                    <a:lumMod val="75000"/>
-                  </a:schemeClr>
-                </a:solidFill>
-                <a:latin typeface="Roboto Light"/>
-                <a:cs typeface="Roboto Light"/>
-              </a:rPr>
-              <a:t>librería</a:t>
-            </a:r>
-          </a:p>
-          <a:p>
-            <a:pPr marL="285750" indent="-285750">
-              <a:buFont typeface="Arial"/>
-              <a:buChar char="•"/>
-            </a:pPr>
-            <a:endParaRPr lang="es-CL" dirty="0">
-              <a:solidFill>
-                <a:schemeClr val="tx2">
-                  <a:lumMod val="75000"/>
-                </a:schemeClr>
-              </a:solidFill>
-              <a:latin typeface="Roboto Light"/>
-              <a:cs typeface="Roboto Light"/>
-            </a:endParaRPr>
-          </a:p>
-          <a:p>
-            <a:pPr marL="285750" indent="-285750">
-              <a:buFont typeface="Arial"/>
-              <a:buChar char="•"/>
-            </a:pPr>
-            <a:r>
-              <a:rPr lang="es-CL" dirty="0">
-                <a:solidFill>
-                  <a:schemeClr val="tx2">
-                    <a:lumMod val="75000"/>
-                  </a:schemeClr>
-                </a:solidFill>
-                <a:latin typeface="Roboto Light"/>
-              </a:rPr>
-              <a:t>Las variables eléctricas de estudio son de fácil acceso dentro del software y los modelos de las librerías bastante completos, razones por las cuales se utilizará </a:t>
-            </a:r>
-            <a:r>
-              <a:rPr lang="es-CL" dirty="0" smtClean="0">
-                <a:solidFill>
-                  <a:schemeClr val="tx2">
-                    <a:lumMod val="75000"/>
-                  </a:schemeClr>
-                </a:solidFill>
-                <a:latin typeface="Roboto Light"/>
-              </a:rPr>
-              <a:t>Simulink</a:t>
-            </a:r>
+            </a:endParaRPr>
+          </a:p>
+          <a:p>
+            <a:pPr marL="285750" indent="-285750">
+              <a:buFont typeface="Arial"/>
+              <a:buChar char="•"/>
+            </a:pPr>
             <a:endParaRPr lang="es-CL" dirty="0">
               <a:solidFill>
                 <a:schemeClr val="tx2">
@@ -4460,6 +5271,36 @@
           <a:xfrm>
             <a:off x="6240435" y="6596185"/>
             <a:ext cx="2133898" cy="240280"/>
+          </a:xfrm>
+          <a:prstGeom prst="rect">
+            <a:avLst/>
+          </a:prstGeom>
+        </p:spPr>
+      </p:pic>
+      <p:pic>
+        <p:nvPicPr>
+          <p:cNvPr id="2" name="Imagen 1"/>
+          <p:cNvPicPr>
+            <a:picLocks noChangeAspect="1"/>
+          </p:cNvPicPr>
+          <p:nvPr/>
+        </p:nvPicPr>
+        <p:blipFill>
+          <a:blip r:embed="rId3">
+            <a:extLst>
+              <a:ext uri="{28A0092B-C50C-407E-A947-70E740481C1C}">
+                <a14:useLocalDpi xmlns:a14="http://schemas.microsoft.com/office/drawing/2010/main" val="0"/>
+              </a:ext>
+            </a:extLst>
+          </a:blip>
+          <a:stretch>
+            <a:fillRect/>
+          </a:stretch>
+        </p:blipFill>
+        <p:spPr>
+          <a:xfrm>
+            <a:off x="2125061" y="2388337"/>
+            <a:ext cx="5182323" cy="1247949"/>
           </a:xfrm>
           <a:prstGeom prst="rect">
             <a:avLst/>
@@ -4579,7 +5420,7 @@
         </p:nvSpPr>
         <p:spPr>
           <a:xfrm>
-            <a:off x="1455821" y="2875548"/>
+            <a:off x="610869" y="687933"/>
             <a:ext cx="6268452" cy="461665"/>
           </a:xfrm>
           <a:prstGeom prst="rect">
@@ -4593,16 +5434,514 @@
           </a:bodyPr>
           <a:lstStyle/>
           <a:p>
-            <a:pPr algn="ctr"/>
-            <a:r>
-              <a:rPr lang="es-CL" sz="2400" b="1" i="1" dirty="0"/>
-              <a:t>M</a:t>
-            </a:r>
-            <a:r>
-              <a:rPr lang="es-CL" sz="2400" b="1" i="1" dirty="0" smtClean="0"/>
-              <a:t>uchas gracias por su atención</a:t>
-            </a:r>
-            <a:endParaRPr lang="es-CL" sz="2400" b="1" i="1" dirty="0"/>
+            <a:r>
+              <a:rPr lang="en-US" sz="2400" b="1" spc="200" dirty="0" err="1" smtClean="0">
+                <a:cs typeface="Roboto Medium"/>
+              </a:rPr>
+              <a:t>Conclusiones</a:t>
+            </a:r>
+            <a:endParaRPr lang="en-US" sz="2400" b="1" spc="200" dirty="0">
+              <a:cs typeface="Roboto Medium"/>
+            </a:endParaRPr>
+          </a:p>
+        </p:txBody>
+      </p:sp>
+      <p:sp>
+        <p:nvSpPr>
+          <p:cNvPr id="3" name="Rectángulo 2"/>
+          <p:cNvSpPr/>
+          <p:nvPr/>
+        </p:nvSpPr>
+        <p:spPr>
+          <a:xfrm>
+            <a:off x="804441" y="1485776"/>
+            <a:ext cx="7569892" cy="3970318"/>
+          </a:xfrm>
+          <a:prstGeom prst="rect">
+            <a:avLst/>
+          </a:prstGeom>
+        </p:spPr>
+        <p:txBody>
+          <a:bodyPr wrap="square">
+            <a:spAutoFit/>
+          </a:bodyPr>
+          <a:lstStyle/>
+          <a:p>
+            <a:pPr marL="285750" indent="-285750">
+              <a:buFont typeface="Arial"/>
+              <a:buChar char="•"/>
+            </a:pPr>
+            <a:r>
+              <a:rPr lang="es-CL" dirty="0" smtClean="0">
+                <a:solidFill>
+                  <a:schemeClr val="tx2">
+                    <a:lumMod val="75000"/>
+                  </a:schemeClr>
+                </a:solidFill>
+                <a:latin typeface="Roboto Light"/>
+                <a:cs typeface="Roboto Light"/>
+              </a:rPr>
+              <a:t>VdF provoca distorsión armónica de alta frecuencia, se ve reflejado en formas de onda de tensión y corriente, produce torque pulsante en alta frecuencia. Velocidad del rotor no se ve ‘contaminada’.</a:t>
+            </a:r>
+          </a:p>
+          <a:p>
+            <a:pPr marL="285750" indent="-285750">
+              <a:buFont typeface="Arial"/>
+              <a:buChar char="•"/>
+            </a:pPr>
+            <a:endParaRPr lang="es-CL" dirty="0" smtClean="0">
+              <a:solidFill>
+                <a:schemeClr val="tx2">
+                  <a:lumMod val="75000"/>
+                </a:schemeClr>
+              </a:solidFill>
+              <a:latin typeface="Roboto Light"/>
+              <a:cs typeface="Roboto Light"/>
+            </a:endParaRPr>
+          </a:p>
+          <a:p>
+            <a:pPr marL="285750" indent="-285750">
+              <a:buFont typeface="Arial"/>
+              <a:buChar char="•"/>
+            </a:pPr>
+            <a:endParaRPr lang="es-CL" dirty="0">
+              <a:solidFill>
+                <a:schemeClr val="tx2">
+                  <a:lumMod val="75000"/>
+                </a:schemeClr>
+              </a:solidFill>
+              <a:latin typeface="Roboto Light"/>
+              <a:cs typeface="Roboto Light"/>
+            </a:endParaRPr>
+          </a:p>
+          <a:p>
+            <a:pPr marL="285750" indent="-285750">
+              <a:buFont typeface="Arial"/>
+              <a:buChar char="•"/>
+            </a:pPr>
+            <a:r>
+              <a:rPr lang="es-CL" dirty="0" smtClean="0">
+                <a:solidFill>
+                  <a:schemeClr val="tx2">
+                    <a:lumMod val="75000"/>
+                  </a:schemeClr>
+                </a:solidFill>
+                <a:latin typeface="Roboto Light"/>
+                <a:cs typeface="Roboto Light"/>
+              </a:rPr>
+              <a:t>Falla desconexión de una fase del Rotor, produce oscilación cíclica en la corriente, contaminación </a:t>
+            </a:r>
+            <a:r>
+              <a:rPr lang="es-CL" dirty="0" err="1" smtClean="0">
+                <a:solidFill>
+                  <a:schemeClr val="tx2">
+                    <a:lumMod val="75000"/>
+                  </a:schemeClr>
+                </a:solidFill>
+                <a:latin typeface="Roboto Light"/>
+                <a:cs typeface="Roboto Light"/>
+              </a:rPr>
+              <a:t>interarmónica</a:t>
+            </a:r>
+            <a:r>
+              <a:rPr lang="es-CL" dirty="0" smtClean="0">
+                <a:solidFill>
+                  <a:schemeClr val="tx2">
+                    <a:lumMod val="75000"/>
+                  </a:schemeClr>
+                </a:solidFill>
+                <a:latin typeface="Roboto Light"/>
+                <a:cs typeface="Roboto Light"/>
+              </a:rPr>
+              <a:t> importante de 20 a 70[Hz</a:t>
+            </a:r>
+            <a:r>
+              <a:rPr lang="en-US" dirty="0" smtClean="0">
+                <a:solidFill>
+                  <a:schemeClr val="tx2">
+                    <a:lumMod val="75000"/>
+                  </a:schemeClr>
+                </a:solidFill>
+                <a:latin typeface="Roboto Light"/>
+                <a:cs typeface="Roboto Light"/>
+              </a:rPr>
+              <a:t>],</a:t>
+            </a:r>
+            <a:r>
+              <a:rPr lang="es-CL" dirty="0" smtClean="0">
+                <a:solidFill>
+                  <a:schemeClr val="tx2">
+                    <a:lumMod val="75000"/>
+                  </a:schemeClr>
+                </a:solidFill>
+                <a:latin typeface="Roboto Light"/>
+                <a:cs typeface="Roboto Light"/>
+              </a:rPr>
+              <a:t> tiene como consecuencia oscilación de velocidad y torque.</a:t>
+            </a:r>
+          </a:p>
+          <a:p>
+            <a:pPr marL="285750" indent="-285750">
+              <a:buFont typeface="Arial"/>
+              <a:buChar char="•"/>
+            </a:pPr>
+            <a:endParaRPr lang="es-CL" dirty="0" smtClean="0">
+              <a:solidFill>
+                <a:schemeClr val="tx2">
+                  <a:lumMod val="75000"/>
+                </a:schemeClr>
+              </a:solidFill>
+              <a:latin typeface="Roboto Light"/>
+              <a:cs typeface="Roboto Light"/>
+            </a:endParaRPr>
+          </a:p>
+          <a:p>
+            <a:pPr marL="285750" indent="-285750">
+              <a:buFont typeface="Arial"/>
+              <a:buChar char="•"/>
+            </a:pPr>
+            <a:endParaRPr lang="es-CL" dirty="0">
+              <a:solidFill>
+                <a:schemeClr val="tx2">
+                  <a:lumMod val="75000"/>
+                </a:schemeClr>
+              </a:solidFill>
+              <a:latin typeface="Roboto Light"/>
+              <a:cs typeface="Roboto Light"/>
+            </a:endParaRPr>
+          </a:p>
+          <a:p>
+            <a:pPr marL="285750" indent="-285750">
+              <a:buFont typeface="Arial"/>
+              <a:buChar char="•"/>
+            </a:pPr>
+            <a:r>
+              <a:rPr lang="en-US" dirty="0" err="1" smtClean="0">
+                <a:solidFill>
+                  <a:schemeClr val="tx2">
+                    <a:lumMod val="75000"/>
+                  </a:schemeClr>
+                </a:solidFill>
+                <a:latin typeface="Roboto Light"/>
+                <a:cs typeface="Roboto Light"/>
+              </a:rPr>
+              <a:t>Falla</a:t>
+            </a:r>
+            <a:r>
+              <a:rPr lang="en-US" dirty="0" smtClean="0">
+                <a:solidFill>
+                  <a:schemeClr val="tx2">
+                    <a:lumMod val="75000"/>
+                  </a:schemeClr>
+                </a:solidFill>
+                <a:latin typeface="Roboto Light"/>
+                <a:cs typeface="Roboto Light"/>
+              </a:rPr>
+              <a:t> entre </a:t>
+            </a:r>
+            <a:r>
+              <a:rPr lang="en-US" dirty="0" err="1" smtClean="0">
+                <a:solidFill>
+                  <a:schemeClr val="tx2">
+                    <a:lumMod val="75000"/>
+                  </a:schemeClr>
+                </a:solidFill>
+                <a:latin typeface="Roboto Light"/>
+                <a:cs typeface="Roboto Light"/>
+              </a:rPr>
+              <a:t>espiras</a:t>
+            </a:r>
+            <a:r>
+              <a:rPr lang="en-US" dirty="0" smtClean="0">
+                <a:solidFill>
+                  <a:schemeClr val="tx2">
+                    <a:lumMod val="75000"/>
+                  </a:schemeClr>
+                </a:solidFill>
+                <a:latin typeface="Roboto Light"/>
+                <a:cs typeface="Roboto Light"/>
+              </a:rPr>
+              <a:t> </a:t>
+            </a:r>
+            <a:r>
+              <a:rPr lang="en-US" dirty="0" err="1" smtClean="0">
+                <a:solidFill>
+                  <a:schemeClr val="tx2">
+                    <a:lumMod val="75000"/>
+                  </a:schemeClr>
+                </a:solidFill>
+                <a:latin typeface="Roboto Light"/>
+                <a:cs typeface="Roboto Light"/>
+              </a:rPr>
+              <a:t>misma</a:t>
+            </a:r>
+            <a:r>
+              <a:rPr lang="en-US" dirty="0" smtClean="0">
+                <a:solidFill>
+                  <a:schemeClr val="tx2">
+                    <a:lumMod val="75000"/>
+                  </a:schemeClr>
+                </a:solidFill>
+                <a:latin typeface="Roboto Light"/>
+                <a:cs typeface="Roboto Light"/>
+              </a:rPr>
+              <a:t> </a:t>
+            </a:r>
+            <a:r>
+              <a:rPr lang="en-US" dirty="0" err="1" smtClean="0">
+                <a:solidFill>
+                  <a:schemeClr val="tx2">
+                    <a:lumMod val="75000"/>
+                  </a:schemeClr>
+                </a:solidFill>
+                <a:latin typeface="Roboto Light"/>
+                <a:cs typeface="Roboto Light"/>
+              </a:rPr>
+              <a:t>fase</a:t>
+            </a:r>
+            <a:r>
+              <a:rPr lang="en-US" dirty="0" smtClean="0">
+                <a:solidFill>
+                  <a:schemeClr val="tx2">
+                    <a:lumMod val="75000"/>
+                  </a:schemeClr>
+                </a:solidFill>
+                <a:latin typeface="Roboto Light"/>
+                <a:cs typeface="Roboto Light"/>
+              </a:rPr>
+              <a:t> </a:t>
+            </a:r>
+            <a:r>
+              <a:rPr lang="en-US" dirty="0" err="1" smtClean="0">
+                <a:solidFill>
+                  <a:schemeClr val="tx2">
+                    <a:lumMod val="75000"/>
+                  </a:schemeClr>
+                </a:solidFill>
+                <a:latin typeface="Roboto Light"/>
+                <a:cs typeface="Roboto Light"/>
+              </a:rPr>
+              <a:t>Estator</a:t>
+            </a:r>
+            <a:r>
+              <a:rPr lang="en-US" dirty="0" smtClean="0">
+                <a:solidFill>
+                  <a:schemeClr val="tx2">
+                    <a:lumMod val="75000"/>
+                  </a:schemeClr>
+                </a:solidFill>
+                <a:latin typeface="Roboto Light"/>
+                <a:cs typeface="Roboto Light"/>
+              </a:rPr>
+              <a:t>, no genera </a:t>
+            </a:r>
+            <a:r>
+              <a:rPr lang="en-US" dirty="0" err="1" smtClean="0">
+                <a:solidFill>
+                  <a:schemeClr val="tx2">
+                    <a:lumMod val="75000"/>
+                  </a:schemeClr>
+                </a:solidFill>
+                <a:latin typeface="Roboto Light"/>
+                <a:cs typeface="Roboto Light"/>
+              </a:rPr>
+              <a:t>contenido</a:t>
+            </a:r>
+            <a:r>
+              <a:rPr lang="en-US" dirty="0" smtClean="0">
+                <a:solidFill>
+                  <a:schemeClr val="tx2">
+                    <a:lumMod val="75000"/>
+                  </a:schemeClr>
+                </a:solidFill>
+                <a:latin typeface="Roboto Light"/>
+                <a:cs typeface="Roboto Light"/>
+              </a:rPr>
+              <a:t> </a:t>
+            </a:r>
+            <a:r>
+              <a:rPr lang="en-US" dirty="0" err="1" smtClean="0">
+                <a:solidFill>
+                  <a:schemeClr val="tx2">
+                    <a:lumMod val="75000"/>
+                  </a:schemeClr>
+                </a:solidFill>
+                <a:latin typeface="Roboto Light"/>
+                <a:cs typeface="Roboto Light"/>
+              </a:rPr>
+              <a:t>armónico</a:t>
+            </a:r>
+            <a:r>
+              <a:rPr lang="en-US" dirty="0" smtClean="0">
+                <a:solidFill>
+                  <a:schemeClr val="tx2">
+                    <a:lumMod val="75000"/>
+                  </a:schemeClr>
+                </a:solidFill>
+                <a:latin typeface="Roboto Light"/>
+                <a:cs typeface="Roboto Light"/>
+              </a:rPr>
+              <a:t> en la </a:t>
+            </a:r>
+            <a:r>
+              <a:rPr lang="en-US" dirty="0" err="1" smtClean="0">
+                <a:solidFill>
+                  <a:schemeClr val="tx2">
+                    <a:lumMod val="75000"/>
+                  </a:schemeClr>
+                </a:solidFill>
+                <a:latin typeface="Roboto Light"/>
+                <a:cs typeface="Roboto Light"/>
+              </a:rPr>
+              <a:t>corriente</a:t>
+            </a:r>
+            <a:r>
+              <a:rPr lang="en-US" dirty="0" smtClean="0">
+                <a:solidFill>
+                  <a:schemeClr val="tx2">
+                    <a:lumMod val="75000"/>
+                  </a:schemeClr>
+                </a:solidFill>
+                <a:latin typeface="Roboto Light"/>
+                <a:cs typeface="Roboto Light"/>
+              </a:rPr>
+              <a:t>, </a:t>
+            </a:r>
+            <a:r>
+              <a:rPr lang="en-US" dirty="0" err="1" smtClean="0">
+                <a:solidFill>
+                  <a:schemeClr val="tx2">
+                    <a:lumMod val="75000"/>
+                  </a:schemeClr>
+                </a:solidFill>
+                <a:latin typeface="Roboto Light"/>
+                <a:cs typeface="Roboto Light"/>
+              </a:rPr>
+              <a:t>pero</a:t>
+            </a:r>
+            <a:r>
+              <a:rPr lang="en-US" dirty="0" smtClean="0">
+                <a:solidFill>
+                  <a:schemeClr val="tx2">
+                    <a:lumMod val="75000"/>
+                  </a:schemeClr>
+                </a:solidFill>
+                <a:latin typeface="Roboto Light"/>
+                <a:cs typeface="Roboto Light"/>
+              </a:rPr>
+              <a:t> produce </a:t>
+            </a:r>
+            <a:r>
+              <a:rPr lang="en-US" dirty="0" err="1" smtClean="0">
+                <a:solidFill>
+                  <a:schemeClr val="tx2">
+                    <a:lumMod val="75000"/>
+                  </a:schemeClr>
+                </a:solidFill>
+                <a:latin typeface="Roboto Light"/>
+                <a:cs typeface="Roboto Light"/>
+              </a:rPr>
+              <a:t>desbalance</a:t>
+            </a:r>
+            <a:r>
+              <a:rPr lang="en-US" dirty="0" smtClean="0">
+                <a:solidFill>
+                  <a:schemeClr val="tx2">
+                    <a:lumMod val="75000"/>
+                  </a:schemeClr>
+                </a:solidFill>
+                <a:latin typeface="Roboto Light"/>
+                <a:cs typeface="Roboto Light"/>
+              </a:rPr>
+              <a:t> y </a:t>
+            </a:r>
+            <a:r>
+              <a:rPr lang="en-US" dirty="0" err="1" smtClean="0">
+                <a:solidFill>
+                  <a:schemeClr val="tx2">
+                    <a:lumMod val="75000"/>
+                  </a:schemeClr>
+                </a:solidFill>
+                <a:latin typeface="Roboto Light"/>
+                <a:cs typeface="Roboto Light"/>
+              </a:rPr>
+              <a:t>oscilación</a:t>
+            </a:r>
+            <a:r>
+              <a:rPr lang="en-US" dirty="0" smtClean="0">
+                <a:solidFill>
+                  <a:schemeClr val="tx2">
+                    <a:lumMod val="75000"/>
+                  </a:schemeClr>
+                </a:solidFill>
+                <a:latin typeface="Roboto Light"/>
+                <a:cs typeface="Roboto Light"/>
+              </a:rPr>
+              <a:t> en </a:t>
+            </a:r>
+            <a:r>
+              <a:rPr lang="en-US" dirty="0" err="1" smtClean="0">
+                <a:solidFill>
+                  <a:schemeClr val="tx2">
+                    <a:lumMod val="75000"/>
+                  </a:schemeClr>
+                </a:solidFill>
+                <a:latin typeface="Roboto Light"/>
+                <a:cs typeface="Roboto Light"/>
+              </a:rPr>
+              <a:t>torno</a:t>
+            </a:r>
+            <a:r>
+              <a:rPr lang="en-US" dirty="0" smtClean="0">
+                <a:solidFill>
+                  <a:schemeClr val="tx2">
+                    <a:lumMod val="75000"/>
+                  </a:schemeClr>
+                </a:solidFill>
+                <a:latin typeface="Roboto Light"/>
+                <a:cs typeface="Roboto Light"/>
+              </a:rPr>
+              <a:t> al valor </a:t>
+            </a:r>
+            <a:r>
+              <a:rPr lang="en-US" dirty="0" err="1" smtClean="0">
+                <a:solidFill>
+                  <a:schemeClr val="tx2">
+                    <a:lumMod val="75000"/>
+                  </a:schemeClr>
+                </a:solidFill>
+                <a:latin typeface="Roboto Light"/>
+                <a:cs typeface="Roboto Light"/>
+              </a:rPr>
+              <a:t>medio</a:t>
+            </a:r>
+            <a:r>
+              <a:rPr lang="en-US" dirty="0" smtClean="0">
+                <a:solidFill>
+                  <a:schemeClr val="tx2">
+                    <a:lumMod val="75000"/>
+                  </a:schemeClr>
+                </a:solidFill>
+                <a:latin typeface="Roboto Light"/>
+                <a:cs typeface="Roboto Light"/>
+              </a:rPr>
+              <a:t> en el Torque.</a:t>
+            </a:r>
+          </a:p>
+          <a:p>
+            <a:pPr marL="285750" indent="-285750">
+              <a:buFont typeface="Arial"/>
+              <a:buChar char="•"/>
+            </a:pPr>
+            <a:endParaRPr lang="en-US" dirty="0">
+              <a:solidFill>
+                <a:schemeClr val="tx2">
+                  <a:lumMod val="75000"/>
+                </a:schemeClr>
+              </a:solidFill>
+              <a:latin typeface="Roboto Light"/>
+              <a:cs typeface="Roboto Light"/>
+            </a:endParaRPr>
           </a:p>
         </p:txBody>
       </p:sp>
@@ -4623,6 +5962,72 @@
       </p:par>
     </p:tnLst>
   </p:timing>
+</p:sld>
+</file>
+
+<file path=ppt/slides/slide19.xml><?xml version="1.0" encoding="utf-8"?>
+<p:sld xmlns:a="http://schemas.openxmlformats.org/drawingml/2006/main" xmlns:r="http://schemas.openxmlformats.org/officeDocument/2006/relationships" xmlns:p="http://schemas.openxmlformats.org/presentationml/2006/main">
+  <p:cSld>
+    <p:spTree>
+      <p:nvGrpSpPr>
+        <p:cNvPr id="1" name=""/>
+        <p:cNvGrpSpPr/>
+        <p:nvPr/>
+      </p:nvGrpSpPr>
+      <p:grpSpPr>
+        <a:xfrm>
+          <a:off x="0" y="0"/>
+          <a:ext cx="0" cy="0"/>
+          <a:chOff x="0" y="0"/>
+          <a:chExt cx="0" cy="0"/>
+        </a:xfrm>
+      </p:grpSpPr>
+      <p:sp>
+        <p:nvSpPr>
+          <p:cNvPr id="3" name="Subtítulo 2"/>
+          <p:cNvSpPr>
+            <a:spLocks noGrp="1"/>
+          </p:cNvSpPr>
+          <p:nvPr>
+            <p:ph type="subTitle" idx="1"/>
+          </p:nvPr>
+        </p:nvSpPr>
+        <p:spPr>
+          <a:xfrm>
+            <a:off x="1371600" y="3009900"/>
+            <a:ext cx="6400800" cy="1752600"/>
+          </a:xfrm>
+        </p:spPr>
+        <p:txBody>
+          <a:bodyPr/>
+          <a:lstStyle/>
+          <a:p>
+            <a:r>
+              <a:rPr lang="es-CL" i="1" dirty="0" smtClean="0">
+                <a:solidFill>
+                  <a:schemeClr val="accent1"/>
+                </a:solidFill>
+              </a:rPr>
+              <a:t>Muchas gracias por su atención</a:t>
+            </a:r>
+            <a:endParaRPr lang="es-CL" i="1" dirty="0">
+              <a:solidFill>
+                <a:schemeClr val="accent1"/>
+              </a:solidFill>
+            </a:endParaRPr>
+          </a:p>
+        </p:txBody>
+      </p:sp>
+    </p:spTree>
+    <p:extLst>
+      <p:ext uri="{BB962C8B-B14F-4D97-AF65-F5344CB8AC3E}">
+        <p14:creationId xmlns:p14="http://schemas.microsoft.com/office/powerpoint/2010/main" val="1147977047"/>
+      </p:ext>
+    </p:extLst>
+  </p:cSld>
+  <p:clrMapOvr>
+    <a:masterClrMapping/>
+  </p:clrMapOvr>
 </p:sld>
 </file>
 
@@ -5571,7 +6976,19 @@
                 <a:latin typeface="+mj-lt"/>
                 <a:cs typeface="Roboto Light"/>
               </a:rPr>
-              <a:t>Motor en presencia de Variador de Frecuencia</a:t>
+              <a:t>Motor de inducción </a:t>
+            </a:r>
+            <a:r>
+              <a:rPr lang="it-IT" dirty="0" smtClean="0">
+                <a:solidFill>
+                  <a:schemeClr val="tx2">
+                    <a:lumMod val="75000"/>
+                  </a:schemeClr>
+                </a:solidFill>
+                <a:latin typeface="+mj-lt"/>
+                <a:cs typeface="Roboto Light"/>
+              </a:rPr>
+              <a:t>en presencia de Variador de Frecuencia</a:t>
             </a:r>
           </a:p>
           <a:p>
@@ -7385,7 +8802,7 @@
               <a:buChar char="•"/>
             </a:pPr>
             <a:r>
-              <a:rPr lang="it-IT" dirty="0" smtClean="0">
+              <a:rPr lang="it-IT" u="sng" dirty="0" smtClean="0">
                 <a:solidFill>
                   <a:schemeClr val="tx2">
                     <a:lumMod val="75000"/>
@@ -7397,7 +8814,7 @@
               <a:t>FFT a corriente Fase A</a:t>
             </a:r>
             <a:br>
-              <a:rPr lang="it-IT" dirty="0" smtClean="0">
+              <a:rPr lang="it-IT" u="sng" dirty="0" smtClean="0">
                 <a:solidFill>
                   <a:schemeClr val="tx2">
                     <a:lumMod val="75000"/>
@@ -7408,7 +8825,7 @@
               </a:rPr>
             </a:br>
             <a:r>
-              <a:rPr lang="it-IT" dirty="0" smtClean="0">
+              <a:rPr lang="it-IT" u="sng" dirty="0" smtClean="0">
                 <a:solidFill>
                   <a:schemeClr val="tx2">
                     <a:lumMod val="75000"/>

</xml_diff>